<commit_message>
Updated the PPT SLides! Hope It's Good!
</commit_message>
<xml_diff>
--- a/Hungry Go THERE.pptx
+++ b/Hungry Go THERE.pptx
@@ -8,6 +8,10 @@
     <p:sldId id="256" r:id="rId2"/>
     <p:sldId id="257" r:id="rId3"/>
     <p:sldId id="258" r:id="rId4"/>
+    <p:sldId id="259" r:id="rId5"/>
+    <p:sldId id="260" r:id="rId6"/>
+    <p:sldId id="261" r:id="rId7"/>
+    <p:sldId id="262" r:id="rId8"/>
   </p:sldIdLst>
   <p:sldSz cx="12192000" cy="6858000"/>
   <p:notesSz cx="6858000" cy="9144000"/>
@@ -106,6 +110,11 @@
       </a:defRPr>
     </a:lvl9pPr>
   </p:defaultTextStyle>
+  <p:extLst>
+    <p:ext uri="{EFAFB233-063F-42B5-8137-9DF3F51BA10A}">
+      <p15:sldGuideLst xmlns:p15="http://schemas.microsoft.com/office/powerpoint/2012/main"/>
+    </p:ext>
+  </p:extLst>
 </p:presentation>
 </file>
 
@@ -3671,6 +3680,61 @@
             <a:r>
               <a:rPr lang="en-US" dirty="0" smtClean="0"/>
               <a:t>WHERE CAN EAT?</a:t>
+            </a:r>
+            <a:endParaRPr lang="en-US" dirty="0"/>
+          </a:p>
+        </p:txBody>
+      </p:sp>
+      <p:sp>
+        <p:nvSpPr>
+          <p:cNvPr id="9" name="Rectangular Callout 8"/>
+          <p:cNvSpPr/>
+          <p:nvPr/>
+        </p:nvSpPr>
+        <p:spPr>
+          <a:xfrm>
+            <a:off x="8892989" y="2302784"/>
+            <a:ext cx="2492188" cy="1472798"/>
+          </a:xfrm>
+          <a:prstGeom prst="wedgeRectCallout">
+            <a:avLst>
+              <a:gd name="adj1" fmla="val -5725"/>
+              <a:gd name="adj2" fmla="val 69804"/>
+            </a:avLst>
+          </a:prstGeom>
+        </p:spPr>
+        <p:style>
+          <a:lnRef idx="2">
+            <a:schemeClr val="accent1">
+              <a:shade val="50000"/>
+            </a:schemeClr>
+          </a:lnRef>
+          <a:fillRef idx="1">
+            <a:schemeClr val="accent1"/>
+          </a:fillRef>
+          <a:effectRef idx="0">
+            <a:schemeClr val="accent1"/>
+          </a:effectRef>
+          <a:fontRef idx="minor">
+            <a:schemeClr val="lt1"/>
+          </a:fontRef>
+        </p:style>
+        <p:txBody>
+          <a:bodyPr rtlCol="0" anchor="ctr"/>
+          <a:lstStyle/>
+          <a:p>
+            <a:pPr algn="ctr"/>
+            <a:r>
+              <a:rPr lang="en-US" dirty="0" smtClean="0"/>
+              <a:t>Let me check with Hungry Go </a:t>
+            </a:r>
+            <a:r>
+              <a:rPr lang="en-US" u="sng" dirty="0" smtClean="0"/>
+              <a:t>T</a:t>
+            </a:r>
+            <a:r>
+              <a:rPr lang="en-US" dirty="0" smtClean="0"/>
+              <a:t>here!</a:t>
             </a:r>
             <a:endParaRPr lang="en-US" dirty="0"/>
           </a:p>
@@ -4059,6 +4123,75 @@
                                       </p:cBhvr>
                                     </p:animEffect>
                                   </p:childTnLst>
+                                  <p:subTnLst>
+                                    <p:set>
+                                      <p:cBhvr override="childStyle">
+                                        <p:cTn dur="1" fill="hold" display="0" masterRel="nextClick" afterEffect="1"/>
+                                        <p:tgtEl>
+                                          <p:spTgt spid="11"/>
+                                        </p:tgtEl>
+                                        <p:attrNameLst>
+                                          <p:attrName>style.visibility</p:attrName>
+                                        </p:attrNameLst>
+                                      </p:cBhvr>
+                                      <p:to>
+                                        <p:strVal val="hidden"/>
+                                      </p:to>
+                                    </p:set>
+                                  </p:subTnLst>
+                                </p:cTn>
+                              </p:par>
+                            </p:childTnLst>
+                          </p:cTn>
+                        </p:par>
+                      </p:childTnLst>
+                    </p:cTn>
+                  </p:par>
+                  <p:par>
+                    <p:cTn id="31" fill="hold">
+                      <p:stCondLst>
+                        <p:cond delay="indefinite"/>
+                      </p:stCondLst>
+                      <p:childTnLst>
+                        <p:par>
+                          <p:cTn id="32" fill="hold">
+                            <p:stCondLst>
+                              <p:cond delay="0"/>
+                            </p:stCondLst>
+                            <p:childTnLst>
+                              <p:par>
+                                <p:cTn id="33" presetID="10" presetClass="entr" presetSubtype="0" fill="hold" grpId="0" nodeType="clickEffect">
+                                  <p:stCondLst>
+                                    <p:cond delay="0"/>
+                                  </p:stCondLst>
+                                  <p:childTnLst>
+                                    <p:set>
+                                      <p:cBhvr>
+                                        <p:cTn id="34" dur="1" fill="hold">
+                                          <p:stCondLst>
+                                            <p:cond delay="0"/>
+                                          </p:stCondLst>
+                                        </p:cTn>
+                                        <p:tgtEl>
+                                          <p:spTgt spid="9"/>
+                                        </p:tgtEl>
+                                        <p:attrNameLst>
+                                          <p:attrName>style.visibility</p:attrName>
+                                        </p:attrNameLst>
+                                      </p:cBhvr>
+                                      <p:to>
+                                        <p:strVal val="visible"/>
+                                      </p:to>
+                                    </p:set>
+                                    <p:animEffect transition="in" filter="fade">
+                                      <p:cBhvr>
+                                        <p:cTn id="35" dur="500"/>
+                                        <p:tgtEl>
+                                          <p:spTgt spid="9"/>
+                                        </p:tgtEl>
+                                      </p:cBhvr>
+                                    </p:animEffect>
+                                  </p:childTnLst>
                                 </p:cTn>
                               </p:par>
                             </p:childTnLst>
@@ -4093,6 +4226,7 @@
       <p:bldP spid="6" grpId="0" animBg="1"/>
       <p:bldP spid="7" grpId="0" animBg="1"/>
       <p:bldP spid="11" grpId="0" animBg="1"/>
+      <p:bldP spid="9" grpId="0" animBg="1"/>
     </p:bldLst>
   </p:timing>
 </p:sld>
@@ -4215,49 +4349,6 @@
           <a:lstStyle/>
           <a:p>
             <a:pPr algn="ctr"/>
-            <a:endParaRPr lang="en-US" sz="4000" dirty="0" smtClean="0">
-              <a:latin typeface="Bernard MT Condensed" panose="02050806060905020404" pitchFamily="18" charset="0"/>
-            </a:endParaRPr>
-          </a:p>
-          <a:p>
-            <a:pPr algn="ctr"/>
-            <a:r>
-              <a:rPr lang="en-US" sz="4000" dirty="0" smtClean="0">
-                <a:latin typeface="Bernard MT Condensed" panose="02050806060905020404" pitchFamily="18" charset="0"/>
-              </a:rPr>
-              <a:t>Hungry Go There!</a:t>
-            </a:r>
-          </a:p>
-          <a:p>
-            <a:pPr algn="ctr"/>
-            <a:endParaRPr lang="en-US" sz="3200" dirty="0"/>
-          </a:p>
-          <a:p>
-            <a:pPr algn="ctr"/>
-            <a:endParaRPr lang="en-US" sz="3200" dirty="0"/>
-          </a:p>
-          <a:p>
-            <a:pPr algn="ctr"/>
-            <a:endParaRPr lang="en-US" sz="3200" dirty="0" smtClean="0"/>
-          </a:p>
-          <a:p>
-            <a:pPr algn="ctr"/>
-            <a:endParaRPr lang="en-US" sz="3200" dirty="0"/>
-          </a:p>
-          <a:p>
-            <a:pPr algn="ctr"/>
-            <a:endParaRPr lang="en-US" sz="3200" dirty="0" smtClean="0"/>
-          </a:p>
-          <a:p>
-            <a:pPr algn="ctr"/>
-            <a:endParaRPr lang="en-US" sz="3200" dirty="0"/>
-          </a:p>
-          <a:p>
-            <a:pPr algn="ctr"/>
-            <a:endParaRPr lang="en-US" sz="3200" dirty="0" smtClean="0"/>
-          </a:p>
-          <a:p>
-            <a:pPr algn="ctr"/>
             <a:endParaRPr lang="en-US" sz="3200" dirty="0"/>
           </a:p>
         </p:txBody>
@@ -4412,7 +4503,9 @@
       </p:sp>
       <p:sp>
         <p:nvSpPr>
-          <p:cNvPr id="10" name="Rounded Rectangle 9"/>
+          <p:cNvPr id="10" name="Rounded Rectangle 9">
+            <a:hlinkClick r:id="rId2" action="ppaction://hlinksldjump"/>
+          </p:cNvPr>
           <p:cNvSpPr/>
           <p:nvPr/>
         </p:nvSpPr>
@@ -4536,55 +4629,51 @@
       </p:sp>
       <p:sp>
         <p:nvSpPr>
-          <p:cNvPr id="12" name="Rounded Rectangle 11"/>
-          <p:cNvSpPr/>
+          <p:cNvPr id="2" name="TextBox 1"/>
+          <p:cNvSpPr txBox="1"/>
           <p:nvPr/>
         </p:nvSpPr>
         <p:spPr>
           <a:xfrm>
-            <a:off x="4482349" y="2277036"/>
-            <a:ext cx="3065929" cy="860612"/>
-          </a:xfrm>
-          <a:prstGeom prst="roundRect">
+            <a:off x="4196064" y="1210565"/>
+            <a:ext cx="3638497" cy="707886"/>
+          </a:xfrm>
+          <a:prstGeom prst="rect">
             <a:avLst/>
           </a:prstGeom>
-          <a:solidFill>
-            <a:schemeClr val="bg1">
-              <a:alpha val="49000"/>
-            </a:schemeClr>
-          </a:solidFill>
-          <a:ln>
-            <a:solidFill>
-              <a:schemeClr val="bg1">
-                <a:lumMod val="50000"/>
-                <a:lumOff val="50000"/>
-              </a:schemeClr>
-            </a:solidFill>
-          </a:ln>
-        </p:spPr>
-        <p:style>
-          <a:lnRef idx="2">
-            <a:schemeClr val="accent1">
-              <a:shade val="50000"/>
-            </a:schemeClr>
-          </a:lnRef>
-          <a:fillRef idx="1">
-            <a:schemeClr val="accent1"/>
-          </a:fillRef>
-          <a:effectRef idx="0">
-            <a:schemeClr val="accent1"/>
-          </a:effectRef>
-          <a:fontRef idx="minor">
-            <a:schemeClr val="lt1"/>
-          </a:fontRef>
-        </p:style>
-        <p:txBody>
-          <a:bodyPr rtlCol="0" anchor="ctr"/>
+          <a:noFill/>
+        </p:spPr>
+        <p:txBody>
+          <a:bodyPr wrap="none" rtlCol="0">
+            <a:spAutoFit/>
+          </a:bodyPr>
           <a:lstStyle/>
           <a:p>
             <a:pPr algn="ctr"/>
-            <a:endParaRPr lang="en-US" sz="2800" dirty="0">
-              <a:latin typeface="Impact" panose="020B0806030902050204" pitchFamily="34" charset="0"/>
+            <a:r>
+              <a:rPr lang="en-US" sz="4000" dirty="0" smtClean="0">
+                <a:latin typeface="Bernard MT Condensed" panose="02050806060905020404" pitchFamily="18" charset="0"/>
+              </a:rPr>
+              <a:t>Hungry </a:t>
+            </a:r>
+            <a:r>
+              <a:rPr lang="en-US" sz="4000" dirty="0">
+                <a:latin typeface="Bernard MT Condensed" panose="02050806060905020404" pitchFamily="18" charset="0"/>
+              </a:rPr>
+              <a:t>Go There</a:t>
+            </a:r>
+            <a:r>
+              <a:rPr lang="en-US" sz="4000" dirty="0" smtClean="0">
+                <a:latin typeface="Bernard MT Condensed" panose="02050806060905020404" pitchFamily="18" charset="0"/>
+              </a:rPr>
+              <a:t>!</a:t>
+            </a:r>
+            <a:r>
+              <a:rPr lang="en-US" sz="4000" dirty="0" smtClean="0"/>
+              <a:t>	</a:t>
+            </a:r>
+            <a:endParaRPr lang="en-US" sz="4000" dirty="0">
+              <a:latin typeface="Bernard MT Condensed" panose="02050806060905020404" pitchFamily="18" charset="0"/>
             </a:endParaRPr>
           </a:p>
         </p:txBody>
@@ -4599,6 +4688,645 @@
   <p:clrMapOvr>
     <a:masterClrMapping/>
   </p:clrMapOvr>
+  <mc:AlternateContent xmlns:mc="http://schemas.openxmlformats.org/markup-compatibility/2006">
+    <mc:Choice xmlns:p14="http://schemas.microsoft.com/office/powerpoint/2010/main" Requires="p14">
+      <p:transition p14:dur="100">
+        <p:cut/>
+      </p:transition>
+    </mc:Choice>
+    <mc:Fallback>
+      <p:transition>
+        <p:cut/>
+      </p:transition>
+    </mc:Fallback>
+  </mc:AlternateContent>
+  <p:timing>
+    <p:tnLst>
+      <p:par>
+        <p:cTn id="1" dur="indefinite" restart="never" nodeType="tmRoot"/>
+      </p:par>
+    </p:tnLst>
+  </p:timing>
+</p:sld>
+</file>
+
+<file path=ppt/slides/slide4.xml><?xml version="1.0" encoding="utf-8"?>
+<p:sld xmlns:a="http://schemas.openxmlformats.org/drawingml/2006/main" xmlns:r="http://schemas.openxmlformats.org/officeDocument/2006/relationships" xmlns:p="http://schemas.openxmlformats.org/presentationml/2006/main">
+  <p:cSld>
+    <p:spTree>
+      <p:nvGrpSpPr>
+        <p:cNvPr id="1" name=""/>
+        <p:cNvGrpSpPr/>
+        <p:nvPr/>
+      </p:nvGrpSpPr>
+      <p:grpSpPr>
+        <a:xfrm>
+          <a:off x="0" y="0"/>
+          <a:ext cx="0" cy="0"/>
+          <a:chOff x="0" y="0"/>
+          <a:chExt cx="0" cy="0"/>
+        </a:xfrm>
+      </p:grpSpPr>
+      <p:sp>
+        <p:nvSpPr>
+          <p:cNvPr id="4" name="Rounded Rectangle 3"/>
+          <p:cNvSpPr/>
+          <p:nvPr/>
+        </p:nvSpPr>
+        <p:spPr>
+          <a:xfrm>
+            <a:off x="3854823" y="89649"/>
+            <a:ext cx="4320989" cy="6696635"/>
+          </a:xfrm>
+          <a:prstGeom prst="roundRect">
+            <a:avLst/>
+          </a:prstGeom>
+          <a:solidFill>
+            <a:schemeClr val="tx1">
+              <a:lumMod val="95000"/>
+            </a:schemeClr>
+          </a:solidFill>
+          <a:ln>
+            <a:solidFill>
+              <a:schemeClr val="bg1">
+                <a:lumMod val="95000"/>
+                <a:lumOff val="5000"/>
+              </a:schemeClr>
+            </a:solidFill>
+          </a:ln>
+        </p:spPr>
+        <p:style>
+          <a:lnRef idx="2">
+            <a:schemeClr val="accent1">
+              <a:shade val="50000"/>
+            </a:schemeClr>
+          </a:lnRef>
+          <a:fillRef idx="1">
+            <a:schemeClr val="accent1"/>
+          </a:fillRef>
+          <a:effectRef idx="0">
+            <a:schemeClr val="accent1"/>
+          </a:effectRef>
+          <a:fontRef idx="minor">
+            <a:schemeClr val="lt1"/>
+          </a:fontRef>
+        </p:style>
+        <p:txBody>
+          <a:bodyPr rtlCol="0" anchor="ctr"/>
+          <a:lstStyle/>
+          <a:p>
+            <a:pPr algn="ctr"/>
+            <a:endParaRPr lang="en-US"/>
+          </a:p>
+        </p:txBody>
+      </p:sp>
+      <p:sp>
+        <p:nvSpPr>
+          <p:cNvPr id="6" name="Rectangle 5"/>
+          <p:cNvSpPr/>
+          <p:nvPr/>
+        </p:nvSpPr>
+        <p:spPr>
+          <a:xfrm>
+            <a:off x="4043081" y="806820"/>
+            <a:ext cx="3944471" cy="4876800"/>
+          </a:xfrm>
+          <a:prstGeom prst="rect">
+            <a:avLst/>
+          </a:prstGeom>
+          <a:solidFill>
+            <a:schemeClr val="bg1">
+              <a:lumMod val="85000"/>
+              <a:lumOff val="15000"/>
+            </a:schemeClr>
+          </a:solidFill>
+          <a:ln>
+            <a:solidFill>
+              <a:schemeClr val="bg1"/>
+            </a:solidFill>
+          </a:ln>
+        </p:spPr>
+        <p:style>
+          <a:lnRef idx="2">
+            <a:schemeClr val="accent1">
+              <a:shade val="50000"/>
+            </a:schemeClr>
+          </a:lnRef>
+          <a:fillRef idx="1">
+            <a:schemeClr val="accent1"/>
+          </a:fillRef>
+          <a:effectRef idx="0">
+            <a:schemeClr val="accent1"/>
+          </a:effectRef>
+          <a:fontRef idx="minor">
+            <a:schemeClr val="lt1"/>
+          </a:fontRef>
+        </p:style>
+        <p:txBody>
+          <a:bodyPr rtlCol="0" anchor="ctr"/>
+          <a:lstStyle/>
+          <a:p>
+            <a:pPr algn="ctr"/>
+            <a:endParaRPr lang="en-US" sz="3200" dirty="0"/>
+          </a:p>
+        </p:txBody>
+      </p:sp>
+      <p:sp>
+        <p:nvSpPr>
+          <p:cNvPr id="7" name="Rectangle 6"/>
+          <p:cNvSpPr/>
+          <p:nvPr/>
+        </p:nvSpPr>
+        <p:spPr>
+          <a:xfrm>
+            <a:off x="5504327" y="376517"/>
+            <a:ext cx="1021977" cy="71718"/>
+          </a:xfrm>
+          <a:prstGeom prst="rect">
+            <a:avLst/>
+          </a:prstGeom>
+          <a:solidFill>
+            <a:schemeClr val="bg1"/>
+          </a:solidFill>
+          <a:ln>
+            <a:solidFill>
+              <a:schemeClr val="bg1"/>
+            </a:solidFill>
+          </a:ln>
+        </p:spPr>
+        <p:style>
+          <a:lnRef idx="2">
+            <a:schemeClr val="accent1">
+              <a:shade val="50000"/>
+            </a:schemeClr>
+          </a:lnRef>
+          <a:fillRef idx="1">
+            <a:schemeClr val="accent1"/>
+          </a:fillRef>
+          <a:effectRef idx="0">
+            <a:schemeClr val="accent1"/>
+          </a:effectRef>
+          <a:fontRef idx="minor">
+            <a:schemeClr val="lt1"/>
+          </a:fontRef>
+        </p:style>
+        <p:txBody>
+          <a:bodyPr rtlCol="0" anchor="ctr"/>
+          <a:lstStyle/>
+          <a:p>
+            <a:pPr algn="ctr"/>
+            <a:endParaRPr lang="en-US"/>
+          </a:p>
+        </p:txBody>
+      </p:sp>
+      <p:sp>
+        <p:nvSpPr>
+          <p:cNvPr id="8" name="Oval 7"/>
+          <p:cNvSpPr/>
+          <p:nvPr/>
+        </p:nvSpPr>
+        <p:spPr>
+          <a:xfrm>
+            <a:off x="5674655" y="5894292"/>
+            <a:ext cx="681320" cy="681320"/>
+          </a:xfrm>
+          <a:prstGeom prst="ellipse">
+            <a:avLst/>
+          </a:prstGeom>
+          <a:solidFill>
+            <a:schemeClr val="tx1">
+              <a:lumMod val="95000"/>
+            </a:schemeClr>
+          </a:solidFill>
+          <a:ln>
+            <a:solidFill>
+              <a:schemeClr val="bg1"/>
+            </a:solidFill>
+          </a:ln>
+        </p:spPr>
+        <p:style>
+          <a:lnRef idx="2">
+            <a:schemeClr val="accent1">
+              <a:shade val="50000"/>
+            </a:schemeClr>
+          </a:lnRef>
+          <a:fillRef idx="1">
+            <a:schemeClr val="accent1"/>
+          </a:fillRef>
+          <a:effectRef idx="0">
+            <a:schemeClr val="accent1"/>
+          </a:effectRef>
+          <a:fontRef idx="minor">
+            <a:schemeClr val="lt1"/>
+          </a:fontRef>
+        </p:style>
+        <p:txBody>
+          <a:bodyPr rtlCol="0" anchor="ctr"/>
+          <a:lstStyle/>
+          <a:p>
+            <a:pPr algn="ctr"/>
+            <a:endParaRPr lang="en-US"/>
+          </a:p>
+        </p:txBody>
+      </p:sp>
+      <p:sp>
+        <p:nvSpPr>
+          <p:cNvPr id="9" name="Oval 8"/>
+          <p:cNvSpPr/>
+          <p:nvPr/>
+        </p:nvSpPr>
+        <p:spPr>
+          <a:xfrm>
+            <a:off x="5800163" y="6019800"/>
+            <a:ext cx="430304" cy="430304"/>
+          </a:xfrm>
+          <a:prstGeom prst="ellipse">
+            <a:avLst/>
+          </a:prstGeom>
+          <a:solidFill>
+            <a:schemeClr val="tx1">
+              <a:lumMod val="95000"/>
+            </a:schemeClr>
+          </a:solidFill>
+          <a:ln>
+            <a:solidFill>
+              <a:schemeClr val="bg1"/>
+            </a:solidFill>
+          </a:ln>
+        </p:spPr>
+        <p:style>
+          <a:lnRef idx="2">
+            <a:schemeClr val="accent1">
+              <a:shade val="50000"/>
+            </a:schemeClr>
+          </a:lnRef>
+          <a:fillRef idx="1">
+            <a:schemeClr val="accent1"/>
+          </a:fillRef>
+          <a:effectRef idx="0">
+            <a:schemeClr val="accent1"/>
+          </a:effectRef>
+          <a:fontRef idx="minor">
+            <a:schemeClr val="lt1"/>
+          </a:fontRef>
+        </p:style>
+        <p:txBody>
+          <a:bodyPr rtlCol="0" anchor="ctr"/>
+          <a:lstStyle/>
+          <a:p>
+            <a:pPr algn="ctr"/>
+            <a:endParaRPr lang="en-US"/>
+          </a:p>
+        </p:txBody>
+      </p:sp>
+      <p:sp>
+        <p:nvSpPr>
+          <p:cNvPr id="3" name="TextBox 2"/>
+          <p:cNvSpPr txBox="1"/>
+          <p:nvPr/>
+        </p:nvSpPr>
+        <p:spPr>
+          <a:xfrm>
+            <a:off x="4599190" y="1165406"/>
+            <a:ext cx="2832250" cy="584775"/>
+          </a:xfrm>
+          <a:prstGeom prst="rect">
+            <a:avLst/>
+          </a:prstGeom>
+          <a:noFill/>
+        </p:spPr>
+        <p:txBody>
+          <a:bodyPr wrap="none" rtlCol="0">
+            <a:spAutoFit/>
+          </a:bodyPr>
+          <a:lstStyle/>
+          <a:p>
+            <a:r>
+              <a:rPr lang="en-US" sz="3200" dirty="0" smtClean="0">
+                <a:latin typeface="Impact" panose="020B0806030902050204" pitchFamily="34" charset="0"/>
+              </a:rPr>
+              <a:t>Where Are You?</a:t>
+            </a:r>
+            <a:endParaRPr lang="en-US" sz="3200" dirty="0">
+              <a:latin typeface="Impact" panose="020B0806030902050204" pitchFamily="34" charset="0"/>
+            </a:endParaRPr>
+          </a:p>
+        </p:txBody>
+      </p:sp>
+      <p:sp>
+        <p:nvSpPr>
+          <p:cNvPr id="5" name="Rectangle 4"/>
+          <p:cNvSpPr/>
+          <p:nvPr/>
+        </p:nvSpPr>
+        <p:spPr>
+          <a:xfrm>
+            <a:off x="4402183" y="1750181"/>
+            <a:ext cx="3200400" cy="358585"/>
+          </a:xfrm>
+          <a:prstGeom prst="rect">
+            <a:avLst/>
+          </a:prstGeom>
+          <a:solidFill>
+            <a:schemeClr val="tx1">
+              <a:lumMod val="85000"/>
+            </a:schemeClr>
+          </a:solidFill>
+          <a:ln>
+            <a:solidFill>
+              <a:schemeClr val="tx1">
+                <a:lumMod val="85000"/>
+              </a:schemeClr>
+            </a:solidFill>
+          </a:ln>
+        </p:spPr>
+        <p:style>
+          <a:lnRef idx="2">
+            <a:schemeClr val="accent1">
+              <a:shade val="50000"/>
+            </a:schemeClr>
+          </a:lnRef>
+          <a:fillRef idx="1">
+            <a:schemeClr val="accent1"/>
+          </a:fillRef>
+          <a:effectRef idx="0">
+            <a:schemeClr val="accent1"/>
+          </a:effectRef>
+          <a:fontRef idx="minor">
+            <a:schemeClr val="lt1"/>
+          </a:fontRef>
+        </p:style>
+        <p:txBody>
+          <a:bodyPr rtlCol="0" anchor="ctr"/>
+          <a:lstStyle/>
+          <a:p>
+            <a:pPr algn="ctr"/>
+            <a:r>
+              <a:rPr lang="en-US" dirty="0" smtClean="0">
+                <a:solidFill>
+                  <a:schemeClr val="bg1"/>
+                </a:solidFill>
+                <a:latin typeface="Calibri" panose="020F0502020204030204" pitchFamily="34" charset="0"/>
+              </a:rPr>
+              <a:t>NUS School of Computing</a:t>
+            </a:r>
+            <a:endParaRPr lang="en-US" dirty="0">
+              <a:solidFill>
+                <a:schemeClr val="bg1"/>
+              </a:solidFill>
+              <a:latin typeface="Calibri" panose="020F0502020204030204" pitchFamily="34" charset="0"/>
+            </a:endParaRPr>
+          </a:p>
+        </p:txBody>
+      </p:sp>
+      <p:sp>
+        <p:nvSpPr>
+          <p:cNvPr id="13" name="Rounded Rectangle 12">
+            <a:hlinkClick r:id="rId3" action="ppaction://hlinksldjump"/>
+          </p:cNvPr>
+          <p:cNvSpPr/>
+          <p:nvPr/>
+        </p:nvSpPr>
+        <p:spPr>
+          <a:xfrm>
+            <a:off x="4715691" y="2268212"/>
+            <a:ext cx="2573383" cy="391886"/>
+          </a:xfrm>
+          <a:prstGeom prst="roundRect">
+            <a:avLst/>
+          </a:prstGeom>
+          <a:solidFill>
+            <a:schemeClr val="accent2"/>
+          </a:solidFill>
+        </p:spPr>
+        <p:style>
+          <a:lnRef idx="2">
+            <a:schemeClr val="accent1">
+              <a:shade val="50000"/>
+            </a:schemeClr>
+          </a:lnRef>
+          <a:fillRef idx="1">
+            <a:schemeClr val="accent1"/>
+          </a:fillRef>
+          <a:effectRef idx="0">
+            <a:schemeClr val="accent1"/>
+          </a:effectRef>
+          <a:fontRef idx="minor">
+            <a:schemeClr val="lt1"/>
+          </a:fontRef>
+        </p:style>
+        <p:txBody>
+          <a:bodyPr rtlCol="0" anchor="ctr"/>
+          <a:lstStyle/>
+          <a:p>
+            <a:pPr algn="ctr"/>
+            <a:r>
+              <a:rPr lang="en-US" dirty="0" smtClean="0"/>
+              <a:t>Use My Current Location</a:t>
+            </a:r>
+            <a:endParaRPr lang="en-US" dirty="0"/>
+          </a:p>
+        </p:txBody>
+      </p:sp>
+      <p:sp>
+        <p:nvSpPr>
+          <p:cNvPr id="15" name="TextBox 14"/>
+          <p:cNvSpPr txBox="1"/>
+          <p:nvPr/>
+        </p:nvSpPr>
+        <p:spPr>
+          <a:xfrm>
+            <a:off x="4856491" y="2960667"/>
+            <a:ext cx="2291781" cy="584775"/>
+          </a:xfrm>
+          <a:prstGeom prst="rect">
+            <a:avLst/>
+          </a:prstGeom>
+          <a:noFill/>
+        </p:spPr>
+        <p:txBody>
+          <a:bodyPr wrap="none" rtlCol="0">
+            <a:spAutoFit/>
+          </a:bodyPr>
+          <a:lstStyle/>
+          <a:p>
+            <a:r>
+              <a:rPr lang="en-US" sz="3200" dirty="0" smtClean="0">
+                <a:latin typeface="Impact" panose="020B0806030902050204" pitchFamily="34" charset="0"/>
+              </a:rPr>
+              <a:t>How You Go?</a:t>
+            </a:r>
+            <a:endParaRPr lang="en-US" sz="3200" dirty="0">
+              <a:latin typeface="Impact" panose="020B0806030902050204" pitchFamily="34" charset="0"/>
+            </a:endParaRPr>
+          </a:p>
+        </p:txBody>
+      </p:sp>
+      <p:sp>
+        <p:nvSpPr>
+          <p:cNvPr id="16" name="TextBox 15"/>
+          <p:cNvSpPr txBox="1"/>
+          <p:nvPr/>
+        </p:nvSpPr>
+        <p:spPr>
+          <a:xfrm>
+            <a:off x="5356350" y="3554799"/>
+            <a:ext cx="1038298" cy="707886"/>
+          </a:xfrm>
+          <a:prstGeom prst="rect">
+            <a:avLst/>
+          </a:prstGeom>
+          <a:noFill/>
+        </p:spPr>
+        <p:txBody>
+          <a:bodyPr wrap="none" rtlCol="0">
+            <a:spAutoFit/>
+          </a:bodyPr>
+          <a:lstStyle/>
+          <a:p>
+            <a:pPr marL="285750" indent="-285750">
+              <a:buFont typeface="Arial" panose="020B0604020202020204" pitchFamily="34" charset="0"/>
+              <a:buChar char="•"/>
+            </a:pPr>
+            <a:r>
+              <a:rPr lang="en-US" sz="2000" b="1" dirty="0" smtClean="0">
+                <a:latin typeface="Calibri" panose="020F0502020204030204" pitchFamily="34" charset="0"/>
+              </a:rPr>
+              <a:t>Walk</a:t>
+            </a:r>
+          </a:p>
+          <a:p>
+            <a:pPr marL="285750" indent="-285750">
+              <a:buFont typeface="Arial" panose="020B0604020202020204" pitchFamily="34" charset="0"/>
+              <a:buChar char="•"/>
+            </a:pPr>
+            <a:r>
+              <a:rPr lang="en-US" sz="2000" b="1" dirty="0" smtClean="0">
+                <a:latin typeface="Calibri" panose="020F0502020204030204" pitchFamily="34" charset="0"/>
+              </a:rPr>
+              <a:t>Drive</a:t>
+            </a:r>
+            <a:endParaRPr lang="en-US" sz="2000" b="1" dirty="0">
+              <a:latin typeface="Calibri" panose="020F0502020204030204" pitchFamily="34" charset="0"/>
+            </a:endParaRPr>
+          </a:p>
+        </p:txBody>
+      </p:sp>
+      <p:sp>
+        <p:nvSpPr>
+          <p:cNvPr id="17" name="Rounded Rectangle 16">
+            <a:hlinkClick r:id="rId4" action="ppaction://hlinksldjump"/>
+          </p:cNvPr>
+          <p:cNvSpPr/>
+          <p:nvPr/>
+        </p:nvSpPr>
+        <p:spPr>
+          <a:xfrm>
+            <a:off x="4153988" y="916836"/>
+            <a:ext cx="548640" cy="204374"/>
+          </a:xfrm>
+          <a:prstGeom prst="roundRect">
+            <a:avLst/>
+          </a:prstGeom>
+          <a:solidFill>
+            <a:schemeClr val="accent2"/>
+          </a:solidFill>
+        </p:spPr>
+        <p:style>
+          <a:lnRef idx="2">
+            <a:schemeClr val="accent1">
+              <a:shade val="50000"/>
+            </a:schemeClr>
+          </a:lnRef>
+          <a:fillRef idx="1">
+            <a:schemeClr val="accent1"/>
+          </a:fillRef>
+          <a:effectRef idx="0">
+            <a:schemeClr val="accent1"/>
+          </a:effectRef>
+          <a:fontRef idx="minor">
+            <a:schemeClr val="lt1"/>
+          </a:fontRef>
+        </p:style>
+        <p:txBody>
+          <a:bodyPr rtlCol="0" anchor="ctr"/>
+          <a:lstStyle/>
+          <a:p>
+            <a:pPr algn="ctr"/>
+            <a:r>
+              <a:rPr lang="en-US" sz="1200" dirty="0" smtClean="0"/>
+              <a:t>Back</a:t>
+            </a:r>
+            <a:endParaRPr lang="en-US" sz="1200" dirty="0"/>
+          </a:p>
+        </p:txBody>
+      </p:sp>
+      <p:sp>
+        <p:nvSpPr>
+          <p:cNvPr id="18" name="Rounded Rectangle 17">
+            <a:hlinkClick r:id="rId5" action="ppaction://hlinksldjump"/>
+          </p:cNvPr>
+          <p:cNvSpPr/>
+          <p:nvPr/>
+        </p:nvSpPr>
+        <p:spPr>
+          <a:xfrm>
+            <a:off x="4728623" y="4621269"/>
+            <a:ext cx="2573383" cy="547825"/>
+          </a:xfrm>
+          <a:prstGeom prst="roundRect">
+            <a:avLst/>
+          </a:prstGeom>
+          <a:solidFill>
+            <a:schemeClr val="accent2"/>
+          </a:solidFill>
+        </p:spPr>
+        <p:style>
+          <a:lnRef idx="2">
+            <a:schemeClr val="accent1">
+              <a:shade val="50000"/>
+            </a:schemeClr>
+          </a:lnRef>
+          <a:fillRef idx="1">
+            <a:schemeClr val="accent1"/>
+          </a:fillRef>
+          <a:effectRef idx="0">
+            <a:schemeClr val="accent1"/>
+          </a:effectRef>
+          <a:fontRef idx="minor">
+            <a:schemeClr val="lt1"/>
+          </a:fontRef>
+        </p:style>
+        <p:txBody>
+          <a:bodyPr rtlCol="0" anchor="ctr"/>
+          <a:lstStyle/>
+          <a:p>
+            <a:pPr algn="ctr"/>
+            <a:r>
+              <a:rPr lang="en-US" dirty="0" smtClean="0">
+                <a:latin typeface="Impact" panose="020B0806030902050204" pitchFamily="34" charset="0"/>
+              </a:rPr>
+              <a:t>Tell Me Where Can Eat!</a:t>
+            </a:r>
+            <a:endParaRPr lang="en-US" dirty="0">
+              <a:latin typeface="Impact" panose="020B0806030902050204" pitchFamily="34" charset="0"/>
+            </a:endParaRPr>
+          </a:p>
+        </p:txBody>
+      </p:sp>
+    </p:spTree>
+    <p:extLst>
+      <p:ext uri="{BB962C8B-B14F-4D97-AF65-F5344CB8AC3E}">
+        <p14:creationId xmlns:p14="http://schemas.microsoft.com/office/powerpoint/2010/main" val="1681826531"/>
+      </p:ext>
+    </p:extLst>
+  </p:cSld>
+  <p:clrMapOvr>
+    <a:masterClrMapping/>
+  </p:clrMapOvr>
+  <p:transition spd="slow">
+    <p:wipe/>
+  </p:transition>
   <p:timing>
     <p:tnLst>
       <p:par>
@@ -4620,10 +5348,13 @@
                             </p:stCondLst>
                             <p:childTnLst>
                               <p:par>
-                                <p:cTn id="5" presetID="1" presetClass="entr" presetSubtype="0" fill="hold" grpId="0" nodeType="clickEffect">
+                                <p:cTn id="5" presetID="1" presetClass="entr" presetSubtype="0" fill="hold" nodeType="clickEffect">
                                   <p:stCondLst>
                                     <p:cond delay="0"/>
                                   </p:stCondLst>
+                                  <p:iterate type="lt">
+                                    <p:tmAbs val="100"/>
+                                  </p:iterate>
                                   <p:childTnLst>
                                     <p:set>
                                       <p:cBhvr>
@@ -4633,7 +5364,11 @@
                                           </p:stCondLst>
                                         </p:cTn>
                                         <p:tgtEl>
-                                          <p:spTgt spid="12"/>
+                                          <p:spTgt spid="5">
+                                            <p:txEl>
+                                              <p:pRg st="0" end="0"/>
+                                            </p:txEl>
+                                          </p:spTgt>
                                         </p:tgtEl>
                                         <p:attrNameLst>
                                           <p:attrName>style.visibility</p:attrName>
@@ -4662,24 +5397,10 @@
                                           </p:endCondLst>
                                         </p:cTn>
                                         <p:tgtEl>
-                                          <p:sndTgt r:embed="rId2" name="click.wav"/>
+                                          <p:sndTgt r:embed="rId2" name="type.wav"/>
                                         </p:tgtEl>
                                       </p:cMediaNode>
                                     </p:audio>
-                                    <p:set>
-                                      <p:cBhvr override="childStyle">
-                                        <p:cTn dur="1" fill="hold" display="0" masterRel="nextClick" afterEffect="1"/>
-                                        <p:tgtEl>
-                                          <p:spTgt spid="12"/>
-                                        </p:tgtEl>
-                                        <p:attrNameLst>
-                                          <p:attrName>style.visibility</p:attrName>
-                                        </p:attrNameLst>
-                                      </p:cBhvr>
-                                      <p:to>
-                                        <p:strVal val="hidden"/>
-                                      </p:to>
-                                    </p:set>
                                   </p:subTnLst>
                                 </p:cTn>
                               </p:par>
@@ -4710,9 +5431,1992 @@
         </p:cTn>
       </p:par>
     </p:tnLst>
-    <p:bldLst>
-      <p:bldP spid="12" grpId="0" animBg="1"/>
-    </p:bldLst>
+  </p:timing>
+</p:sld>
+</file>
+
+<file path=ppt/slides/slide5.xml><?xml version="1.0" encoding="utf-8"?>
+<p:sld xmlns:a="http://schemas.openxmlformats.org/drawingml/2006/main" xmlns:r="http://schemas.openxmlformats.org/officeDocument/2006/relationships" xmlns:p="http://schemas.openxmlformats.org/presentationml/2006/main">
+  <p:cSld>
+    <p:spTree>
+      <p:nvGrpSpPr>
+        <p:cNvPr id="1" name=""/>
+        <p:cNvGrpSpPr/>
+        <p:nvPr/>
+      </p:nvGrpSpPr>
+      <p:grpSpPr>
+        <a:xfrm>
+          <a:off x="0" y="0"/>
+          <a:ext cx="0" cy="0"/>
+          <a:chOff x="0" y="0"/>
+          <a:chExt cx="0" cy="0"/>
+        </a:xfrm>
+      </p:grpSpPr>
+      <p:sp>
+        <p:nvSpPr>
+          <p:cNvPr id="4" name="Rounded Rectangle 3"/>
+          <p:cNvSpPr/>
+          <p:nvPr/>
+        </p:nvSpPr>
+        <p:spPr>
+          <a:xfrm>
+            <a:off x="3854823" y="89649"/>
+            <a:ext cx="4320989" cy="6696635"/>
+          </a:xfrm>
+          <a:prstGeom prst="roundRect">
+            <a:avLst/>
+          </a:prstGeom>
+          <a:solidFill>
+            <a:schemeClr val="tx1">
+              <a:lumMod val="95000"/>
+            </a:schemeClr>
+          </a:solidFill>
+          <a:ln>
+            <a:solidFill>
+              <a:schemeClr val="bg1">
+                <a:lumMod val="95000"/>
+                <a:lumOff val="5000"/>
+              </a:schemeClr>
+            </a:solidFill>
+          </a:ln>
+        </p:spPr>
+        <p:style>
+          <a:lnRef idx="2">
+            <a:schemeClr val="accent1">
+              <a:shade val="50000"/>
+            </a:schemeClr>
+          </a:lnRef>
+          <a:fillRef idx="1">
+            <a:schemeClr val="accent1"/>
+          </a:fillRef>
+          <a:effectRef idx="0">
+            <a:schemeClr val="accent1"/>
+          </a:effectRef>
+          <a:fontRef idx="minor">
+            <a:schemeClr val="lt1"/>
+          </a:fontRef>
+        </p:style>
+        <p:txBody>
+          <a:bodyPr rtlCol="0" anchor="ctr"/>
+          <a:lstStyle/>
+          <a:p>
+            <a:pPr algn="ctr"/>
+            <a:endParaRPr lang="en-US"/>
+          </a:p>
+        </p:txBody>
+      </p:sp>
+      <p:sp>
+        <p:nvSpPr>
+          <p:cNvPr id="6" name="Rectangle 5"/>
+          <p:cNvSpPr/>
+          <p:nvPr/>
+        </p:nvSpPr>
+        <p:spPr>
+          <a:xfrm>
+            <a:off x="4043081" y="806820"/>
+            <a:ext cx="3944471" cy="4876800"/>
+          </a:xfrm>
+          <a:prstGeom prst="rect">
+            <a:avLst/>
+          </a:prstGeom>
+          <a:solidFill>
+            <a:schemeClr val="bg1">
+              <a:lumMod val="85000"/>
+              <a:lumOff val="15000"/>
+            </a:schemeClr>
+          </a:solidFill>
+          <a:ln>
+            <a:solidFill>
+              <a:schemeClr val="bg1"/>
+            </a:solidFill>
+          </a:ln>
+        </p:spPr>
+        <p:style>
+          <a:lnRef idx="2">
+            <a:schemeClr val="accent1">
+              <a:shade val="50000"/>
+            </a:schemeClr>
+          </a:lnRef>
+          <a:fillRef idx="1">
+            <a:schemeClr val="accent1"/>
+          </a:fillRef>
+          <a:effectRef idx="0">
+            <a:schemeClr val="accent1"/>
+          </a:effectRef>
+          <a:fontRef idx="minor">
+            <a:schemeClr val="lt1"/>
+          </a:fontRef>
+        </p:style>
+        <p:txBody>
+          <a:bodyPr rtlCol="0" anchor="ctr"/>
+          <a:lstStyle/>
+          <a:p>
+            <a:pPr algn="ctr"/>
+            <a:endParaRPr lang="en-US" sz="3200" dirty="0"/>
+          </a:p>
+        </p:txBody>
+      </p:sp>
+      <p:sp>
+        <p:nvSpPr>
+          <p:cNvPr id="7" name="Rectangle 6"/>
+          <p:cNvSpPr/>
+          <p:nvPr/>
+        </p:nvSpPr>
+        <p:spPr>
+          <a:xfrm>
+            <a:off x="5504327" y="376517"/>
+            <a:ext cx="1021977" cy="71718"/>
+          </a:xfrm>
+          <a:prstGeom prst="rect">
+            <a:avLst/>
+          </a:prstGeom>
+          <a:solidFill>
+            <a:schemeClr val="bg1"/>
+          </a:solidFill>
+          <a:ln>
+            <a:solidFill>
+              <a:schemeClr val="bg1"/>
+            </a:solidFill>
+          </a:ln>
+        </p:spPr>
+        <p:style>
+          <a:lnRef idx="2">
+            <a:schemeClr val="accent1">
+              <a:shade val="50000"/>
+            </a:schemeClr>
+          </a:lnRef>
+          <a:fillRef idx="1">
+            <a:schemeClr val="accent1"/>
+          </a:fillRef>
+          <a:effectRef idx="0">
+            <a:schemeClr val="accent1"/>
+          </a:effectRef>
+          <a:fontRef idx="minor">
+            <a:schemeClr val="lt1"/>
+          </a:fontRef>
+        </p:style>
+        <p:txBody>
+          <a:bodyPr rtlCol="0" anchor="ctr"/>
+          <a:lstStyle/>
+          <a:p>
+            <a:pPr algn="ctr"/>
+            <a:endParaRPr lang="en-US"/>
+          </a:p>
+        </p:txBody>
+      </p:sp>
+      <p:sp>
+        <p:nvSpPr>
+          <p:cNvPr id="8" name="Oval 7"/>
+          <p:cNvSpPr/>
+          <p:nvPr/>
+        </p:nvSpPr>
+        <p:spPr>
+          <a:xfrm>
+            <a:off x="5674655" y="5894292"/>
+            <a:ext cx="681320" cy="681320"/>
+          </a:xfrm>
+          <a:prstGeom prst="ellipse">
+            <a:avLst/>
+          </a:prstGeom>
+          <a:solidFill>
+            <a:schemeClr val="tx1">
+              <a:lumMod val="95000"/>
+            </a:schemeClr>
+          </a:solidFill>
+          <a:ln>
+            <a:solidFill>
+              <a:schemeClr val="bg1"/>
+            </a:solidFill>
+          </a:ln>
+        </p:spPr>
+        <p:style>
+          <a:lnRef idx="2">
+            <a:schemeClr val="accent1">
+              <a:shade val="50000"/>
+            </a:schemeClr>
+          </a:lnRef>
+          <a:fillRef idx="1">
+            <a:schemeClr val="accent1"/>
+          </a:fillRef>
+          <a:effectRef idx="0">
+            <a:schemeClr val="accent1"/>
+          </a:effectRef>
+          <a:fontRef idx="minor">
+            <a:schemeClr val="lt1"/>
+          </a:fontRef>
+        </p:style>
+        <p:txBody>
+          <a:bodyPr rtlCol="0" anchor="ctr"/>
+          <a:lstStyle/>
+          <a:p>
+            <a:pPr algn="ctr"/>
+            <a:endParaRPr lang="en-US"/>
+          </a:p>
+        </p:txBody>
+      </p:sp>
+      <p:sp>
+        <p:nvSpPr>
+          <p:cNvPr id="9" name="Oval 8"/>
+          <p:cNvSpPr/>
+          <p:nvPr/>
+        </p:nvSpPr>
+        <p:spPr>
+          <a:xfrm>
+            <a:off x="5800163" y="6019800"/>
+            <a:ext cx="430304" cy="430304"/>
+          </a:xfrm>
+          <a:prstGeom prst="ellipse">
+            <a:avLst/>
+          </a:prstGeom>
+          <a:solidFill>
+            <a:schemeClr val="tx1">
+              <a:lumMod val="95000"/>
+            </a:schemeClr>
+          </a:solidFill>
+          <a:ln>
+            <a:solidFill>
+              <a:schemeClr val="bg1"/>
+            </a:solidFill>
+          </a:ln>
+        </p:spPr>
+        <p:style>
+          <a:lnRef idx="2">
+            <a:schemeClr val="accent1">
+              <a:shade val="50000"/>
+            </a:schemeClr>
+          </a:lnRef>
+          <a:fillRef idx="1">
+            <a:schemeClr val="accent1"/>
+          </a:fillRef>
+          <a:effectRef idx="0">
+            <a:schemeClr val="accent1"/>
+          </a:effectRef>
+          <a:fontRef idx="minor">
+            <a:schemeClr val="lt1"/>
+          </a:fontRef>
+        </p:style>
+        <p:txBody>
+          <a:bodyPr rtlCol="0" anchor="ctr"/>
+          <a:lstStyle/>
+          <a:p>
+            <a:pPr algn="ctr"/>
+            <a:endParaRPr lang="en-US"/>
+          </a:p>
+        </p:txBody>
+      </p:sp>
+      <p:sp>
+        <p:nvSpPr>
+          <p:cNvPr id="3" name="TextBox 2"/>
+          <p:cNvSpPr txBox="1"/>
+          <p:nvPr/>
+        </p:nvSpPr>
+        <p:spPr>
+          <a:xfrm>
+            <a:off x="4599190" y="1165406"/>
+            <a:ext cx="2832250" cy="584775"/>
+          </a:xfrm>
+          <a:prstGeom prst="rect">
+            <a:avLst/>
+          </a:prstGeom>
+          <a:noFill/>
+        </p:spPr>
+        <p:txBody>
+          <a:bodyPr wrap="none" rtlCol="0">
+            <a:spAutoFit/>
+          </a:bodyPr>
+          <a:lstStyle/>
+          <a:p>
+            <a:r>
+              <a:rPr lang="en-US" sz="3200" dirty="0" smtClean="0">
+                <a:latin typeface="Impact" panose="020B0806030902050204" pitchFamily="34" charset="0"/>
+              </a:rPr>
+              <a:t>Where Are You?</a:t>
+            </a:r>
+            <a:endParaRPr lang="en-US" sz="3200" dirty="0">
+              <a:latin typeface="Impact" panose="020B0806030902050204" pitchFamily="34" charset="0"/>
+            </a:endParaRPr>
+          </a:p>
+        </p:txBody>
+      </p:sp>
+      <p:sp>
+        <p:nvSpPr>
+          <p:cNvPr id="5" name="Rectangle 4"/>
+          <p:cNvSpPr/>
+          <p:nvPr/>
+        </p:nvSpPr>
+        <p:spPr>
+          <a:xfrm>
+            <a:off x="4402183" y="1750181"/>
+            <a:ext cx="3200400" cy="358585"/>
+          </a:xfrm>
+          <a:prstGeom prst="rect">
+            <a:avLst/>
+          </a:prstGeom>
+          <a:solidFill>
+            <a:schemeClr val="tx1">
+              <a:lumMod val="85000"/>
+            </a:schemeClr>
+          </a:solidFill>
+          <a:ln>
+            <a:solidFill>
+              <a:schemeClr val="tx1">
+                <a:lumMod val="85000"/>
+              </a:schemeClr>
+            </a:solidFill>
+          </a:ln>
+        </p:spPr>
+        <p:style>
+          <a:lnRef idx="2">
+            <a:schemeClr val="accent1">
+              <a:shade val="50000"/>
+            </a:schemeClr>
+          </a:lnRef>
+          <a:fillRef idx="1">
+            <a:schemeClr val="accent1"/>
+          </a:fillRef>
+          <a:effectRef idx="0">
+            <a:schemeClr val="accent1"/>
+          </a:effectRef>
+          <a:fontRef idx="minor">
+            <a:schemeClr val="lt1"/>
+          </a:fontRef>
+        </p:style>
+        <p:txBody>
+          <a:bodyPr rtlCol="0" anchor="ctr"/>
+          <a:lstStyle/>
+          <a:p>
+            <a:pPr algn="ctr"/>
+            <a:r>
+              <a:rPr lang="en-US" dirty="0" smtClean="0">
+                <a:solidFill>
+                  <a:schemeClr val="bg1"/>
+                </a:solidFill>
+                <a:latin typeface="Calibri" panose="020F0502020204030204" pitchFamily="34" charset="0"/>
+              </a:rPr>
+              <a:t>NUS School of Computing</a:t>
+            </a:r>
+            <a:endParaRPr lang="en-US" dirty="0">
+              <a:solidFill>
+                <a:schemeClr val="bg1"/>
+              </a:solidFill>
+              <a:latin typeface="Calibri" panose="020F0502020204030204" pitchFamily="34" charset="0"/>
+            </a:endParaRPr>
+          </a:p>
+        </p:txBody>
+      </p:sp>
+      <p:sp>
+        <p:nvSpPr>
+          <p:cNvPr id="13" name="Rounded Rectangle 12">
+            <a:hlinkClick r:id="rId2" action="ppaction://hlinksldjump"/>
+          </p:cNvPr>
+          <p:cNvSpPr/>
+          <p:nvPr/>
+        </p:nvSpPr>
+        <p:spPr>
+          <a:xfrm>
+            <a:off x="4715691" y="2268212"/>
+            <a:ext cx="2573383" cy="391886"/>
+          </a:xfrm>
+          <a:prstGeom prst="roundRect">
+            <a:avLst/>
+          </a:prstGeom>
+          <a:solidFill>
+            <a:schemeClr val="accent2"/>
+          </a:solidFill>
+        </p:spPr>
+        <p:style>
+          <a:lnRef idx="2">
+            <a:schemeClr val="accent1">
+              <a:shade val="50000"/>
+            </a:schemeClr>
+          </a:lnRef>
+          <a:fillRef idx="1">
+            <a:schemeClr val="accent1"/>
+          </a:fillRef>
+          <a:effectRef idx="0">
+            <a:schemeClr val="accent1"/>
+          </a:effectRef>
+          <a:fontRef idx="minor">
+            <a:schemeClr val="lt1"/>
+          </a:fontRef>
+        </p:style>
+        <p:txBody>
+          <a:bodyPr rtlCol="0" anchor="ctr"/>
+          <a:lstStyle/>
+          <a:p>
+            <a:pPr algn="ctr"/>
+            <a:r>
+              <a:rPr lang="en-US" dirty="0" smtClean="0"/>
+              <a:t>Use My Current Location</a:t>
+            </a:r>
+            <a:endParaRPr lang="en-US" dirty="0"/>
+          </a:p>
+        </p:txBody>
+      </p:sp>
+      <p:sp>
+        <p:nvSpPr>
+          <p:cNvPr id="15" name="TextBox 14"/>
+          <p:cNvSpPr txBox="1"/>
+          <p:nvPr/>
+        </p:nvSpPr>
+        <p:spPr>
+          <a:xfrm>
+            <a:off x="4856491" y="2960667"/>
+            <a:ext cx="2291781" cy="584775"/>
+          </a:xfrm>
+          <a:prstGeom prst="rect">
+            <a:avLst/>
+          </a:prstGeom>
+          <a:noFill/>
+        </p:spPr>
+        <p:txBody>
+          <a:bodyPr wrap="none" rtlCol="0">
+            <a:spAutoFit/>
+          </a:bodyPr>
+          <a:lstStyle/>
+          <a:p>
+            <a:r>
+              <a:rPr lang="en-US" sz="3200" dirty="0" smtClean="0">
+                <a:latin typeface="Impact" panose="020B0806030902050204" pitchFamily="34" charset="0"/>
+              </a:rPr>
+              <a:t>How You Go?</a:t>
+            </a:r>
+            <a:endParaRPr lang="en-US" sz="3200" dirty="0">
+              <a:latin typeface="Impact" panose="020B0806030902050204" pitchFamily="34" charset="0"/>
+            </a:endParaRPr>
+          </a:p>
+        </p:txBody>
+      </p:sp>
+      <p:sp>
+        <p:nvSpPr>
+          <p:cNvPr id="16" name="TextBox 15"/>
+          <p:cNvSpPr txBox="1"/>
+          <p:nvPr/>
+        </p:nvSpPr>
+        <p:spPr>
+          <a:xfrm>
+            <a:off x="5356350" y="3554799"/>
+            <a:ext cx="1038298" cy="707886"/>
+          </a:xfrm>
+          <a:prstGeom prst="rect">
+            <a:avLst/>
+          </a:prstGeom>
+          <a:noFill/>
+        </p:spPr>
+        <p:txBody>
+          <a:bodyPr wrap="none" rtlCol="0">
+            <a:spAutoFit/>
+          </a:bodyPr>
+          <a:lstStyle/>
+          <a:p>
+            <a:pPr marL="285750" indent="-285750">
+              <a:buFont typeface="Arial" panose="020B0604020202020204" pitchFamily="34" charset="0"/>
+              <a:buChar char="•"/>
+            </a:pPr>
+            <a:r>
+              <a:rPr lang="en-US" sz="2000" b="1" dirty="0" smtClean="0">
+                <a:latin typeface="Calibri" panose="020F0502020204030204" pitchFamily="34" charset="0"/>
+              </a:rPr>
+              <a:t>Walk</a:t>
+            </a:r>
+          </a:p>
+          <a:p>
+            <a:pPr marL="285750" indent="-285750">
+              <a:buFont typeface="Arial" panose="020B0604020202020204" pitchFamily="34" charset="0"/>
+              <a:buChar char="•"/>
+            </a:pPr>
+            <a:r>
+              <a:rPr lang="en-US" sz="2000" b="1" dirty="0" smtClean="0">
+                <a:latin typeface="Calibri" panose="020F0502020204030204" pitchFamily="34" charset="0"/>
+              </a:rPr>
+              <a:t>Drive</a:t>
+            </a:r>
+            <a:endParaRPr lang="en-US" sz="2000" b="1" dirty="0">
+              <a:latin typeface="Calibri" panose="020F0502020204030204" pitchFamily="34" charset="0"/>
+            </a:endParaRPr>
+          </a:p>
+        </p:txBody>
+      </p:sp>
+      <p:sp>
+        <p:nvSpPr>
+          <p:cNvPr id="17" name="Rounded Rectangle 16">
+            <a:hlinkClick r:id="rId3" action="ppaction://hlinksldjump"/>
+          </p:cNvPr>
+          <p:cNvSpPr/>
+          <p:nvPr/>
+        </p:nvSpPr>
+        <p:spPr>
+          <a:xfrm>
+            <a:off x="4153988" y="916836"/>
+            <a:ext cx="548640" cy="204374"/>
+          </a:xfrm>
+          <a:prstGeom prst="roundRect">
+            <a:avLst/>
+          </a:prstGeom>
+          <a:solidFill>
+            <a:schemeClr val="accent2"/>
+          </a:solidFill>
+        </p:spPr>
+        <p:style>
+          <a:lnRef idx="2">
+            <a:schemeClr val="accent1">
+              <a:shade val="50000"/>
+            </a:schemeClr>
+          </a:lnRef>
+          <a:fillRef idx="1">
+            <a:schemeClr val="accent1"/>
+          </a:fillRef>
+          <a:effectRef idx="0">
+            <a:schemeClr val="accent1"/>
+          </a:effectRef>
+          <a:fontRef idx="minor">
+            <a:schemeClr val="lt1"/>
+          </a:fontRef>
+        </p:style>
+        <p:txBody>
+          <a:bodyPr rtlCol="0" anchor="ctr"/>
+          <a:lstStyle/>
+          <a:p>
+            <a:pPr algn="ctr"/>
+            <a:r>
+              <a:rPr lang="en-US" sz="1200" dirty="0" smtClean="0"/>
+              <a:t>Back</a:t>
+            </a:r>
+            <a:endParaRPr lang="en-US" sz="1200" dirty="0"/>
+          </a:p>
+        </p:txBody>
+      </p:sp>
+      <p:sp>
+        <p:nvSpPr>
+          <p:cNvPr id="18" name="Rounded Rectangle 17">
+            <a:hlinkClick r:id="rId4" action="ppaction://hlinksldjump"/>
+          </p:cNvPr>
+          <p:cNvSpPr/>
+          <p:nvPr/>
+        </p:nvSpPr>
+        <p:spPr>
+          <a:xfrm>
+            <a:off x="4728623" y="4621269"/>
+            <a:ext cx="2573383" cy="547825"/>
+          </a:xfrm>
+          <a:prstGeom prst="roundRect">
+            <a:avLst/>
+          </a:prstGeom>
+          <a:solidFill>
+            <a:schemeClr val="accent2"/>
+          </a:solidFill>
+        </p:spPr>
+        <p:style>
+          <a:lnRef idx="2">
+            <a:schemeClr val="accent1">
+              <a:shade val="50000"/>
+            </a:schemeClr>
+          </a:lnRef>
+          <a:fillRef idx="1">
+            <a:schemeClr val="accent1"/>
+          </a:fillRef>
+          <a:effectRef idx="0">
+            <a:schemeClr val="accent1"/>
+          </a:effectRef>
+          <a:fontRef idx="minor">
+            <a:schemeClr val="lt1"/>
+          </a:fontRef>
+        </p:style>
+        <p:txBody>
+          <a:bodyPr rtlCol="0" anchor="ctr"/>
+          <a:lstStyle/>
+          <a:p>
+            <a:pPr algn="ctr"/>
+            <a:r>
+              <a:rPr lang="en-US" dirty="0" smtClean="0">
+                <a:latin typeface="Impact" panose="020B0806030902050204" pitchFamily="34" charset="0"/>
+              </a:rPr>
+              <a:t>Tell Me Where Can Eat!</a:t>
+            </a:r>
+            <a:endParaRPr lang="en-US" dirty="0">
+              <a:latin typeface="Impact" panose="020B0806030902050204" pitchFamily="34" charset="0"/>
+            </a:endParaRPr>
+          </a:p>
+        </p:txBody>
+      </p:sp>
+    </p:spTree>
+    <p:extLst>
+      <p:ext uri="{BB962C8B-B14F-4D97-AF65-F5344CB8AC3E}">
+        <p14:creationId xmlns:p14="http://schemas.microsoft.com/office/powerpoint/2010/main" val="4282207813"/>
+      </p:ext>
+    </p:extLst>
+  </p:cSld>
+  <p:clrMapOvr>
+    <a:masterClrMapping/>
+  </p:clrMapOvr>
+  <p:transition spd="slow">
+    <p:wipe/>
+  </p:transition>
+  <p:timing>
+    <p:tnLst>
+      <p:par>
+        <p:cTn id="1" dur="indefinite" restart="never" nodeType="tmRoot"/>
+      </p:par>
+    </p:tnLst>
+  </p:timing>
+</p:sld>
+</file>
+
+<file path=ppt/slides/slide6.xml><?xml version="1.0" encoding="utf-8"?>
+<p:sld xmlns:a="http://schemas.openxmlformats.org/drawingml/2006/main" xmlns:r="http://schemas.openxmlformats.org/officeDocument/2006/relationships" xmlns:p="http://schemas.openxmlformats.org/presentationml/2006/main">
+  <p:cSld>
+    <p:spTree>
+      <p:nvGrpSpPr>
+        <p:cNvPr id="1" name=""/>
+        <p:cNvGrpSpPr/>
+        <p:nvPr/>
+      </p:nvGrpSpPr>
+      <p:grpSpPr>
+        <a:xfrm>
+          <a:off x="0" y="0"/>
+          <a:ext cx="0" cy="0"/>
+          <a:chOff x="0" y="0"/>
+          <a:chExt cx="0" cy="0"/>
+        </a:xfrm>
+      </p:grpSpPr>
+      <p:sp>
+        <p:nvSpPr>
+          <p:cNvPr id="4" name="Rounded Rectangle 3"/>
+          <p:cNvSpPr/>
+          <p:nvPr/>
+        </p:nvSpPr>
+        <p:spPr>
+          <a:xfrm>
+            <a:off x="3854823" y="89649"/>
+            <a:ext cx="4320989" cy="6696635"/>
+          </a:xfrm>
+          <a:prstGeom prst="roundRect">
+            <a:avLst/>
+          </a:prstGeom>
+          <a:solidFill>
+            <a:schemeClr val="tx1">
+              <a:lumMod val="95000"/>
+            </a:schemeClr>
+          </a:solidFill>
+          <a:ln>
+            <a:solidFill>
+              <a:schemeClr val="bg1">
+                <a:lumMod val="95000"/>
+                <a:lumOff val="5000"/>
+              </a:schemeClr>
+            </a:solidFill>
+          </a:ln>
+        </p:spPr>
+        <p:style>
+          <a:lnRef idx="2">
+            <a:schemeClr val="accent1">
+              <a:shade val="50000"/>
+            </a:schemeClr>
+          </a:lnRef>
+          <a:fillRef idx="1">
+            <a:schemeClr val="accent1"/>
+          </a:fillRef>
+          <a:effectRef idx="0">
+            <a:schemeClr val="accent1"/>
+          </a:effectRef>
+          <a:fontRef idx="minor">
+            <a:schemeClr val="lt1"/>
+          </a:fontRef>
+        </p:style>
+        <p:txBody>
+          <a:bodyPr rtlCol="0" anchor="ctr"/>
+          <a:lstStyle/>
+          <a:p>
+            <a:pPr algn="ctr"/>
+            <a:endParaRPr lang="en-US"/>
+          </a:p>
+        </p:txBody>
+      </p:sp>
+      <p:sp>
+        <p:nvSpPr>
+          <p:cNvPr id="6" name="Rectangle 5"/>
+          <p:cNvSpPr/>
+          <p:nvPr/>
+        </p:nvSpPr>
+        <p:spPr>
+          <a:xfrm>
+            <a:off x="4043081" y="806820"/>
+            <a:ext cx="3944471" cy="4876800"/>
+          </a:xfrm>
+          <a:prstGeom prst="rect">
+            <a:avLst/>
+          </a:prstGeom>
+          <a:solidFill>
+            <a:schemeClr val="bg1">
+              <a:lumMod val="85000"/>
+              <a:lumOff val="15000"/>
+            </a:schemeClr>
+          </a:solidFill>
+          <a:ln>
+            <a:solidFill>
+              <a:schemeClr val="bg1"/>
+            </a:solidFill>
+          </a:ln>
+        </p:spPr>
+        <p:style>
+          <a:lnRef idx="2">
+            <a:schemeClr val="accent1">
+              <a:shade val="50000"/>
+            </a:schemeClr>
+          </a:lnRef>
+          <a:fillRef idx="1">
+            <a:schemeClr val="accent1"/>
+          </a:fillRef>
+          <a:effectRef idx="0">
+            <a:schemeClr val="accent1"/>
+          </a:effectRef>
+          <a:fontRef idx="minor">
+            <a:schemeClr val="lt1"/>
+          </a:fontRef>
+        </p:style>
+        <p:txBody>
+          <a:bodyPr rtlCol="0" anchor="ctr"/>
+          <a:lstStyle/>
+          <a:p>
+            <a:pPr algn="ctr"/>
+            <a:endParaRPr lang="en-US" sz="3200" dirty="0"/>
+          </a:p>
+        </p:txBody>
+      </p:sp>
+      <p:sp>
+        <p:nvSpPr>
+          <p:cNvPr id="7" name="Rectangle 6"/>
+          <p:cNvSpPr/>
+          <p:nvPr/>
+        </p:nvSpPr>
+        <p:spPr>
+          <a:xfrm>
+            <a:off x="5504327" y="376517"/>
+            <a:ext cx="1021977" cy="71718"/>
+          </a:xfrm>
+          <a:prstGeom prst="rect">
+            <a:avLst/>
+          </a:prstGeom>
+          <a:solidFill>
+            <a:schemeClr val="bg1"/>
+          </a:solidFill>
+          <a:ln>
+            <a:solidFill>
+              <a:schemeClr val="bg1"/>
+            </a:solidFill>
+          </a:ln>
+        </p:spPr>
+        <p:style>
+          <a:lnRef idx="2">
+            <a:schemeClr val="accent1">
+              <a:shade val="50000"/>
+            </a:schemeClr>
+          </a:lnRef>
+          <a:fillRef idx="1">
+            <a:schemeClr val="accent1"/>
+          </a:fillRef>
+          <a:effectRef idx="0">
+            <a:schemeClr val="accent1"/>
+          </a:effectRef>
+          <a:fontRef idx="minor">
+            <a:schemeClr val="lt1"/>
+          </a:fontRef>
+        </p:style>
+        <p:txBody>
+          <a:bodyPr rtlCol="0" anchor="ctr"/>
+          <a:lstStyle/>
+          <a:p>
+            <a:pPr algn="ctr"/>
+            <a:endParaRPr lang="en-US"/>
+          </a:p>
+        </p:txBody>
+      </p:sp>
+      <p:sp>
+        <p:nvSpPr>
+          <p:cNvPr id="8" name="Oval 7"/>
+          <p:cNvSpPr/>
+          <p:nvPr/>
+        </p:nvSpPr>
+        <p:spPr>
+          <a:xfrm>
+            <a:off x="5674655" y="5894292"/>
+            <a:ext cx="681320" cy="681320"/>
+          </a:xfrm>
+          <a:prstGeom prst="ellipse">
+            <a:avLst/>
+          </a:prstGeom>
+          <a:solidFill>
+            <a:schemeClr val="tx1">
+              <a:lumMod val="95000"/>
+            </a:schemeClr>
+          </a:solidFill>
+          <a:ln>
+            <a:solidFill>
+              <a:schemeClr val="bg1"/>
+            </a:solidFill>
+          </a:ln>
+        </p:spPr>
+        <p:style>
+          <a:lnRef idx="2">
+            <a:schemeClr val="accent1">
+              <a:shade val="50000"/>
+            </a:schemeClr>
+          </a:lnRef>
+          <a:fillRef idx="1">
+            <a:schemeClr val="accent1"/>
+          </a:fillRef>
+          <a:effectRef idx="0">
+            <a:schemeClr val="accent1"/>
+          </a:effectRef>
+          <a:fontRef idx="minor">
+            <a:schemeClr val="lt1"/>
+          </a:fontRef>
+        </p:style>
+        <p:txBody>
+          <a:bodyPr rtlCol="0" anchor="ctr"/>
+          <a:lstStyle/>
+          <a:p>
+            <a:pPr algn="ctr"/>
+            <a:endParaRPr lang="en-US"/>
+          </a:p>
+        </p:txBody>
+      </p:sp>
+      <p:sp>
+        <p:nvSpPr>
+          <p:cNvPr id="9" name="Oval 8"/>
+          <p:cNvSpPr/>
+          <p:nvPr/>
+        </p:nvSpPr>
+        <p:spPr>
+          <a:xfrm>
+            <a:off x="5800163" y="6019800"/>
+            <a:ext cx="430304" cy="430304"/>
+          </a:xfrm>
+          <a:prstGeom prst="ellipse">
+            <a:avLst/>
+          </a:prstGeom>
+          <a:solidFill>
+            <a:schemeClr val="tx1">
+              <a:lumMod val="95000"/>
+            </a:schemeClr>
+          </a:solidFill>
+          <a:ln>
+            <a:solidFill>
+              <a:schemeClr val="bg1"/>
+            </a:solidFill>
+          </a:ln>
+        </p:spPr>
+        <p:style>
+          <a:lnRef idx="2">
+            <a:schemeClr val="accent1">
+              <a:shade val="50000"/>
+            </a:schemeClr>
+          </a:lnRef>
+          <a:fillRef idx="1">
+            <a:schemeClr val="accent1"/>
+          </a:fillRef>
+          <a:effectRef idx="0">
+            <a:schemeClr val="accent1"/>
+          </a:effectRef>
+          <a:fontRef idx="minor">
+            <a:schemeClr val="lt1"/>
+          </a:fontRef>
+        </p:style>
+        <p:txBody>
+          <a:bodyPr rtlCol="0" anchor="ctr"/>
+          <a:lstStyle/>
+          <a:p>
+            <a:pPr algn="ctr"/>
+            <a:endParaRPr lang="en-US"/>
+          </a:p>
+        </p:txBody>
+      </p:sp>
+      <p:sp>
+        <p:nvSpPr>
+          <p:cNvPr id="17" name="Rounded Rectangle 16">
+            <a:hlinkClick r:id="rId2" action="ppaction://hlinksldjump"/>
+          </p:cNvPr>
+          <p:cNvSpPr/>
+          <p:nvPr/>
+        </p:nvSpPr>
+        <p:spPr>
+          <a:xfrm>
+            <a:off x="4153988" y="916836"/>
+            <a:ext cx="548640" cy="204374"/>
+          </a:xfrm>
+          <a:prstGeom prst="roundRect">
+            <a:avLst/>
+          </a:prstGeom>
+          <a:solidFill>
+            <a:schemeClr val="accent2"/>
+          </a:solidFill>
+        </p:spPr>
+        <p:style>
+          <a:lnRef idx="2">
+            <a:schemeClr val="accent1">
+              <a:shade val="50000"/>
+            </a:schemeClr>
+          </a:lnRef>
+          <a:fillRef idx="1">
+            <a:schemeClr val="accent1"/>
+          </a:fillRef>
+          <a:effectRef idx="0">
+            <a:schemeClr val="accent1"/>
+          </a:effectRef>
+          <a:fontRef idx="minor">
+            <a:schemeClr val="lt1"/>
+          </a:fontRef>
+        </p:style>
+        <p:txBody>
+          <a:bodyPr rtlCol="0" anchor="ctr"/>
+          <a:lstStyle/>
+          <a:p>
+            <a:pPr algn="ctr"/>
+            <a:r>
+              <a:rPr lang="en-US" sz="1200" dirty="0" smtClean="0"/>
+              <a:t>Back</a:t>
+            </a:r>
+            <a:endParaRPr lang="en-US" sz="1200" dirty="0"/>
+          </a:p>
+        </p:txBody>
+      </p:sp>
+      <p:pic>
+        <p:nvPicPr>
+          <p:cNvPr id="2" name="Picture 1"/>
+          <p:cNvPicPr>
+            <a:picLocks noChangeAspect="1"/>
+          </p:cNvPicPr>
+          <p:nvPr/>
+        </p:nvPicPr>
+        <p:blipFill>
+          <a:blip r:embed="rId3"/>
+          <a:stretch>
+            <a:fillRect/>
+          </a:stretch>
+        </p:blipFill>
+        <p:spPr>
+          <a:xfrm>
+            <a:off x="4119261" y="1354057"/>
+            <a:ext cx="3792108" cy="3112203"/>
+          </a:xfrm>
+          <a:prstGeom prst="rect">
+            <a:avLst/>
+          </a:prstGeom>
+        </p:spPr>
+      </p:pic>
+      <p:sp>
+        <p:nvSpPr>
+          <p:cNvPr id="19" name="Rounded Rectangle 18">
+            <a:hlinkClick r:id="rId4" action="ppaction://hlinksldjump"/>
+          </p:cNvPr>
+          <p:cNvSpPr/>
+          <p:nvPr/>
+        </p:nvSpPr>
+        <p:spPr>
+          <a:xfrm>
+            <a:off x="5264393" y="4808994"/>
+            <a:ext cx="1501844" cy="547825"/>
+          </a:xfrm>
+          <a:prstGeom prst="roundRect">
+            <a:avLst/>
+          </a:prstGeom>
+          <a:solidFill>
+            <a:schemeClr val="accent2"/>
+          </a:solidFill>
+        </p:spPr>
+        <p:style>
+          <a:lnRef idx="2">
+            <a:schemeClr val="accent1">
+              <a:shade val="50000"/>
+            </a:schemeClr>
+          </a:lnRef>
+          <a:fillRef idx="1">
+            <a:schemeClr val="accent1"/>
+          </a:fillRef>
+          <a:effectRef idx="0">
+            <a:schemeClr val="accent1"/>
+          </a:effectRef>
+          <a:fontRef idx="minor">
+            <a:schemeClr val="lt1"/>
+          </a:fontRef>
+        </p:style>
+        <p:txBody>
+          <a:bodyPr rtlCol="0" anchor="ctr"/>
+          <a:lstStyle/>
+          <a:p>
+            <a:pPr algn="ctr"/>
+            <a:r>
+              <a:rPr lang="en-US" dirty="0" smtClean="0">
+                <a:latin typeface="Impact" panose="020B0806030902050204" pitchFamily="34" charset="0"/>
+              </a:rPr>
+              <a:t>LIST VIEW</a:t>
+            </a:r>
+            <a:endParaRPr lang="en-US" dirty="0">
+              <a:latin typeface="Impact" panose="020B0806030902050204" pitchFamily="34" charset="0"/>
+            </a:endParaRPr>
+          </a:p>
+        </p:txBody>
+      </p:sp>
+    </p:spTree>
+    <p:extLst>
+      <p:ext uri="{BB962C8B-B14F-4D97-AF65-F5344CB8AC3E}">
+        <p14:creationId xmlns:p14="http://schemas.microsoft.com/office/powerpoint/2010/main" val="3304369583"/>
+      </p:ext>
+    </p:extLst>
+  </p:cSld>
+  <p:clrMapOvr>
+    <a:masterClrMapping/>
+  </p:clrMapOvr>
+  <p:transition spd="slow">
+    <p:wipe/>
+  </p:transition>
+  <p:timing>
+    <p:tnLst>
+      <p:par>
+        <p:cTn id="1" dur="indefinite" restart="never" nodeType="tmRoot"/>
+      </p:par>
+    </p:tnLst>
+  </p:timing>
+</p:sld>
+</file>
+
+<file path=ppt/slides/slide7.xml><?xml version="1.0" encoding="utf-8"?>
+<p:sld xmlns:a="http://schemas.openxmlformats.org/drawingml/2006/main" xmlns:r="http://schemas.openxmlformats.org/officeDocument/2006/relationships" xmlns:p="http://schemas.openxmlformats.org/presentationml/2006/main">
+  <p:cSld>
+    <p:spTree>
+      <p:nvGrpSpPr>
+        <p:cNvPr id="1" name=""/>
+        <p:cNvGrpSpPr/>
+        <p:nvPr/>
+      </p:nvGrpSpPr>
+      <p:grpSpPr>
+        <a:xfrm>
+          <a:off x="0" y="0"/>
+          <a:ext cx="0" cy="0"/>
+          <a:chOff x="0" y="0"/>
+          <a:chExt cx="0" cy="0"/>
+        </a:xfrm>
+      </p:grpSpPr>
+      <p:sp>
+        <p:nvSpPr>
+          <p:cNvPr id="4" name="Rounded Rectangle 3"/>
+          <p:cNvSpPr/>
+          <p:nvPr/>
+        </p:nvSpPr>
+        <p:spPr>
+          <a:xfrm>
+            <a:off x="3854823" y="89649"/>
+            <a:ext cx="4320989" cy="6696635"/>
+          </a:xfrm>
+          <a:prstGeom prst="roundRect">
+            <a:avLst/>
+          </a:prstGeom>
+          <a:solidFill>
+            <a:schemeClr val="tx1">
+              <a:lumMod val="95000"/>
+            </a:schemeClr>
+          </a:solidFill>
+          <a:ln>
+            <a:solidFill>
+              <a:schemeClr val="bg1">
+                <a:lumMod val="95000"/>
+                <a:lumOff val="5000"/>
+              </a:schemeClr>
+            </a:solidFill>
+          </a:ln>
+        </p:spPr>
+        <p:style>
+          <a:lnRef idx="2">
+            <a:schemeClr val="accent1">
+              <a:shade val="50000"/>
+            </a:schemeClr>
+          </a:lnRef>
+          <a:fillRef idx="1">
+            <a:schemeClr val="accent1"/>
+          </a:fillRef>
+          <a:effectRef idx="0">
+            <a:schemeClr val="accent1"/>
+          </a:effectRef>
+          <a:fontRef idx="minor">
+            <a:schemeClr val="lt1"/>
+          </a:fontRef>
+        </p:style>
+        <p:txBody>
+          <a:bodyPr rtlCol="0" anchor="ctr"/>
+          <a:lstStyle/>
+          <a:p>
+            <a:pPr algn="ctr"/>
+            <a:endParaRPr lang="en-US"/>
+          </a:p>
+        </p:txBody>
+      </p:sp>
+      <p:sp>
+        <p:nvSpPr>
+          <p:cNvPr id="6" name="Rectangle 5"/>
+          <p:cNvSpPr/>
+          <p:nvPr/>
+        </p:nvSpPr>
+        <p:spPr>
+          <a:xfrm>
+            <a:off x="4043081" y="806820"/>
+            <a:ext cx="3944471" cy="4876800"/>
+          </a:xfrm>
+          <a:prstGeom prst="rect">
+            <a:avLst/>
+          </a:prstGeom>
+          <a:solidFill>
+            <a:schemeClr val="bg1">
+              <a:lumMod val="85000"/>
+              <a:lumOff val="15000"/>
+            </a:schemeClr>
+          </a:solidFill>
+          <a:ln>
+            <a:solidFill>
+              <a:schemeClr val="bg1"/>
+            </a:solidFill>
+          </a:ln>
+        </p:spPr>
+        <p:style>
+          <a:lnRef idx="2">
+            <a:schemeClr val="accent1">
+              <a:shade val="50000"/>
+            </a:schemeClr>
+          </a:lnRef>
+          <a:fillRef idx="1">
+            <a:schemeClr val="accent1"/>
+          </a:fillRef>
+          <a:effectRef idx="0">
+            <a:schemeClr val="accent1"/>
+          </a:effectRef>
+          <a:fontRef idx="minor">
+            <a:schemeClr val="lt1"/>
+          </a:fontRef>
+        </p:style>
+        <p:txBody>
+          <a:bodyPr rtlCol="0" anchor="ctr"/>
+          <a:lstStyle/>
+          <a:p>
+            <a:pPr algn="ctr"/>
+            <a:endParaRPr lang="en-US" sz="3200" dirty="0"/>
+          </a:p>
+        </p:txBody>
+      </p:sp>
+      <p:sp>
+        <p:nvSpPr>
+          <p:cNvPr id="7" name="Rectangle 6"/>
+          <p:cNvSpPr/>
+          <p:nvPr/>
+        </p:nvSpPr>
+        <p:spPr>
+          <a:xfrm>
+            <a:off x="5504327" y="376517"/>
+            <a:ext cx="1021977" cy="71718"/>
+          </a:xfrm>
+          <a:prstGeom prst="rect">
+            <a:avLst/>
+          </a:prstGeom>
+          <a:solidFill>
+            <a:schemeClr val="bg1"/>
+          </a:solidFill>
+          <a:ln>
+            <a:solidFill>
+              <a:schemeClr val="bg1"/>
+            </a:solidFill>
+          </a:ln>
+        </p:spPr>
+        <p:style>
+          <a:lnRef idx="2">
+            <a:schemeClr val="accent1">
+              <a:shade val="50000"/>
+            </a:schemeClr>
+          </a:lnRef>
+          <a:fillRef idx="1">
+            <a:schemeClr val="accent1"/>
+          </a:fillRef>
+          <a:effectRef idx="0">
+            <a:schemeClr val="accent1"/>
+          </a:effectRef>
+          <a:fontRef idx="minor">
+            <a:schemeClr val="lt1"/>
+          </a:fontRef>
+        </p:style>
+        <p:txBody>
+          <a:bodyPr rtlCol="0" anchor="ctr"/>
+          <a:lstStyle/>
+          <a:p>
+            <a:pPr algn="ctr"/>
+            <a:endParaRPr lang="en-US"/>
+          </a:p>
+        </p:txBody>
+      </p:sp>
+      <p:sp>
+        <p:nvSpPr>
+          <p:cNvPr id="8" name="Oval 7"/>
+          <p:cNvSpPr/>
+          <p:nvPr/>
+        </p:nvSpPr>
+        <p:spPr>
+          <a:xfrm>
+            <a:off x="5674655" y="5894292"/>
+            <a:ext cx="681320" cy="681320"/>
+          </a:xfrm>
+          <a:prstGeom prst="ellipse">
+            <a:avLst/>
+          </a:prstGeom>
+          <a:solidFill>
+            <a:schemeClr val="tx1">
+              <a:lumMod val="95000"/>
+            </a:schemeClr>
+          </a:solidFill>
+          <a:ln>
+            <a:solidFill>
+              <a:schemeClr val="bg1"/>
+            </a:solidFill>
+          </a:ln>
+        </p:spPr>
+        <p:style>
+          <a:lnRef idx="2">
+            <a:schemeClr val="accent1">
+              <a:shade val="50000"/>
+            </a:schemeClr>
+          </a:lnRef>
+          <a:fillRef idx="1">
+            <a:schemeClr val="accent1"/>
+          </a:fillRef>
+          <a:effectRef idx="0">
+            <a:schemeClr val="accent1"/>
+          </a:effectRef>
+          <a:fontRef idx="minor">
+            <a:schemeClr val="lt1"/>
+          </a:fontRef>
+        </p:style>
+        <p:txBody>
+          <a:bodyPr rtlCol="0" anchor="ctr"/>
+          <a:lstStyle/>
+          <a:p>
+            <a:pPr algn="ctr"/>
+            <a:endParaRPr lang="en-US"/>
+          </a:p>
+        </p:txBody>
+      </p:sp>
+      <p:sp>
+        <p:nvSpPr>
+          <p:cNvPr id="9" name="Oval 8"/>
+          <p:cNvSpPr/>
+          <p:nvPr/>
+        </p:nvSpPr>
+        <p:spPr>
+          <a:xfrm>
+            <a:off x="5800163" y="6019800"/>
+            <a:ext cx="430304" cy="430304"/>
+          </a:xfrm>
+          <a:prstGeom prst="ellipse">
+            <a:avLst/>
+          </a:prstGeom>
+          <a:solidFill>
+            <a:schemeClr val="tx1">
+              <a:lumMod val="95000"/>
+            </a:schemeClr>
+          </a:solidFill>
+          <a:ln>
+            <a:solidFill>
+              <a:schemeClr val="bg1"/>
+            </a:solidFill>
+          </a:ln>
+        </p:spPr>
+        <p:style>
+          <a:lnRef idx="2">
+            <a:schemeClr val="accent1">
+              <a:shade val="50000"/>
+            </a:schemeClr>
+          </a:lnRef>
+          <a:fillRef idx="1">
+            <a:schemeClr val="accent1"/>
+          </a:fillRef>
+          <a:effectRef idx="0">
+            <a:schemeClr val="accent1"/>
+          </a:effectRef>
+          <a:fontRef idx="minor">
+            <a:schemeClr val="lt1"/>
+          </a:fontRef>
+        </p:style>
+        <p:txBody>
+          <a:bodyPr rtlCol="0" anchor="ctr"/>
+          <a:lstStyle/>
+          <a:p>
+            <a:pPr algn="ctr"/>
+            <a:endParaRPr lang="en-US"/>
+          </a:p>
+        </p:txBody>
+      </p:sp>
+      <p:sp>
+        <p:nvSpPr>
+          <p:cNvPr id="17" name="Rounded Rectangle 16">
+            <a:hlinkClick r:id="rId2" action="ppaction://hlinksldjump"/>
+          </p:cNvPr>
+          <p:cNvSpPr/>
+          <p:nvPr/>
+        </p:nvSpPr>
+        <p:spPr>
+          <a:xfrm>
+            <a:off x="4153988" y="916836"/>
+            <a:ext cx="548640" cy="204374"/>
+          </a:xfrm>
+          <a:prstGeom prst="roundRect">
+            <a:avLst/>
+          </a:prstGeom>
+          <a:solidFill>
+            <a:schemeClr val="accent2"/>
+          </a:solidFill>
+        </p:spPr>
+        <p:style>
+          <a:lnRef idx="2">
+            <a:schemeClr val="accent1">
+              <a:shade val="50000"/>
+            </a:schemeClr>
+          </a:lnRef>
+          <a:fillRef idx="1">
+            <a:schemeClr val="accent1"/>
+          </a:fillRef>
+          <a:effectRef idx="0">
+            <a:schemeClr val="accent1"/>
+          </a:effectRef>
+          <a:fontRef idx="minor">
+            <a:schemeClr val="lt1"/>
+          </a:fontRef>
+        </p:style>
+        <p:txBody>
+          <a:bodyPr rtlCol="0" anchor="ctr"/>
+          <a:lstStyle/>
+          <a:p>
+            <a:pPr algn="ctr"/>
+            <a:r>
+              <a:rPr lang="en-US" sz="1200" dirty="0" smtClean="0"/>
+              <a:t>Back</a:t>
+            </a:r>
+            <a:endParaRPr lang="en-US" sz="1200" dirty="0"/>
+          </a:p>
+        </p:txBody>
+      </p:sp>
+      <p:sp>
+        <p:nvSpPr>
+          <p:cNvPr id="19" name="Rounded Rectangle 18">
+            <a:hlinkClick r:id="rId3" action="ppaction://hlinksldjump"/>
+          </p:cNvPr>
+          <p:cNvSpPr/>
+          <p:nvPr/>
+        </p:nvSpPr>
+        <p:spPr>
+          <a:xfrm>
+            <a:off x="6792685" y="903774"/>
+            <a:ext cx="1065133" cy="298010"/>
+          </a:xfrm>
+          <a:prstGeom prst="roundRect">
+            <a:avLst/>
+          </a:prstGeom>
+          <a:solidFill>
+            <a:schemeClr val="accent2"/>
+          </a:solidFill>
+        </p:spPr>
+        <p:style>
+          <a:lnRef idx="2">
+            <a:schemeClr val="accent1">
+              <a:shade val="50000"/>
+            </a:schemeClr>
+          </a:lnRef>
+          <a:fillRef idx="1">
+            <a:schemeClr val="accent1"/>
+          </a:fillRef>
+          <a:effectRef idx="0">
+            <a:schemeClr val="accent1"/>
+          </a:effectRef>
+          <a:fontRef idx="minor">
+            <a:schemeClr val="lt1"/>
+          </a:fontRef>
+        </p:style>
+        <p:txBody>
+          <a:bodyPr rtlCol="0" anchor="ctr"/>
+          <a:lstStyle/>
+          <a:p>
+            <a:pPr algn="ctr"/>
+            <a:r>
+              <a:rPr lang="en-US" sz="1400" dirty="0" smtClean="0">
+                <a:latin typeface="Impact" panose="020B0806030902050204" pitchFamily="34" charset="0"/>
+              </a:rPr>
+              <a:t>Map View</a:t>
+            </a:r>
+            <a:endParaRPr lang="en-US" sz="1400" dirty="0">
+              <a:latin typeface="Impact" panose="020B0806030902050204" pitchFamily="34" charset="0"/>
+            </a:endParaRPr>
+          </a:p>
+        </p:txBody>
+      </p:sp>
+      <p:pic>
+        <p:nvPicPr>
+          <p:cNvPr id="5" name="Picture 4"/>
+          <p:cNvPicPr>
+            <a:picLocks noChangeAspect="1"/>
+          </p:cNvPicPr>
+          <p:nvPr/>
+        </p:nvPicPr>
+        <p:blipFill>
+          <a:blip r:embed="rId4">
+            <a:extLst>
+              <a:ext uri="{28A0092B-C50C-407E-A947-70E740481C1C}">
+                <a14:useLocalDpi xmlns:a14="http://schemas.microsoft.com/office/drawing/2010/main" val="0"/>
+              </a:ext>
+            </a:extLst>
+          </a:blip>
+          <a:stretch>
+            <a:fillRect/>
+          </a:stretch>
+        </p:blipFill>
+        <p:spPr>
+          <a:xfrm>
+            <a:off x="4243605" y="1519836"/>
+            <a:ext cx="369405" cy="637090"/>
+          </a:xfrm>
+          <a:prstGeom prst="rect">
+            <a:avLst/>
+          </a:prstGeom>
+        </p:spPr>
+      </p:pic>
+      <p:sp>
+        <p:nvSpPr>
+          <p:cNvPr id="10" name="TextBox 9"/>
+          <p:cNvSpPr txBox="1"/>
+          <p:nvPr/>
+        </p:nvSpPr>
+        <p:spPr>
+          <a:xfrm>
+            <a:off x="4290527" y="1519836"/>
+            <a:ext cx="301686" cy="369332"/>
+          </a:xfrm>
+          <a:prstGeom prst="rect">
+            <a:avLst/>
+          </a:prstGeom>
+          <a:noFill/>
+        </p:spPr>
+        <p:txBody>
+          <a:bodyPr wrap="none" rtlCol="0">
+            <a:spAutoFit/>
+          </a:bodyPr>
+          <a:lstStyle/>
+          <a:p>
+            <a:r>
+              <a:rPr lang="en-US" dirty="0" smtClean="0">
+                <a:solidFill>
+                  <a:schemeClr val="bg1"/>
+                </a:solidFill>
+                <a:latin typeface="Impact" panose="020B0806030902050204" pitchFamily="34" charset="0"/>
+              </a:rPr>
+              <a:t>A</a:t>
+            </a:r>
+            <a:endParaRPr lang="en-US" dirty="0">
+              <a:solidFill>
+                <a:schemeClr val="bg1"/>
+              </a:solidFill>
+              <a:latin typeface="Impact" panose="020B0806030902050204" pitchFamily="34" charset="0"/>
+            </a:endParaRPr>
+          </a:p>
+        </p:txBody>
+      </p:sp>
+      <p:sp>
+        <p:nvSpPr>
+          <p:cNvPr id="11" name="TextBox 10"/>
+          <p:cNvSpPr txBox="1"/>
+          <p:nvPr/>
+        </p:nvSpPr>
+        <p:spPr>
+          <a:xfrm>
+            <a:off x="4702628" y="2790491"/>
+            <a:ext cx="2920415" cy="461665"/>
+          </a:xfrm>
+          <a:prstGeom prst="rect">
+            <a:avLst/>
+          </a:prstGeom>
+          <a:noFill/>
+        </p:spPr>
+        <p:txBody>
+          <a:bodyPr wrap="none" rtlCol="0">
+            <a:spAutoFit/>
+          </a:bodyPr>
+          <a:lstStyle/>
+          <a:p>
+            <a:r>
+              <a:rPr lang="en-US" sz="2400" b="1" dirty="0" err="1" smtClean="0">
+                <a:latin typeface="Calibri" panose="020F0502020204030204" pitchFamily="34" charset="0"/>
+              </a:rPr>
+              <a:t>Ameen</a:t>
+            </a:r>
+            <a:r>
+              <a:rPr lang="en-US" sz="2400" b="1" dirty="0" smtClean="0">
+                <a:latin typeface="Calibri" panose="020F0502020204030204" pitchFamily="34" charset="0"/>
+              </a:rPr>
+              <a:t> </a:t>
+            </a:r>
+            <a:r>
+              <a:rPr lang="en-US" sz="2400" b="1" dirty="0" err="1" smtClean="0">
+                <a:latin typeface="Calibri" panose="020F0502020204030204" pitchFamily="34" charset="0"/>
+              </a:rPr>
+              <a:t>Makan</a:t>
+            </a:r>
+            <a:r>
+              <a:rPr lang="en-US" sz="2400" b="1" dirty="0" smtClean="0">
+                <a:latin typeface="Calibri" panose="020F0502020204030204" pitchFamily="34" charset="0"/>
+              </a:rPr>
+              <a:t> House</a:t>
+            </a:r>
+            <a:endParaRPr lang="en-US" sz="2400" b="1" dirty="0">
+              <a:latin typeface="Calibri" panose="020F0502020204030204" pitchFamily="34" charset="0"/>
+            </a:endParaRPr>
+          </a:p>
+        </p:txBody>
+      </p:sp>
+      <p:pic>
+        <p:nvPicPr>
+          <p:cNvPr id="15" name="Picture 14"/>
+          <p:cNvPicPr>
+            <a:picLocks noChangeAspect="1"/>
+          </p:cNvPicPr>
+          <p:nvPr/>
+        </p:nvPicPr>
+        <p:blipFill>
+          <a:blip r:embed="rId4">
+            <a:extLst>
+              <a:ext uri="{28A0092B-C50C-407E-A947-70E740481C1C}">
+                <a14:useLocalDpi xmlns:a14="http://schemas.microsoft.com/office/drawing/2010/main" val="0"/>
+              </a:ext>
+            </a:extLst>
+          </a:blip>
+          <a:stretch>
+            <a:fillRect/>
+          </a:stretch>
+        </p:blipFill>
+        <p:spPr>
+          <a:xfrm>
+            <a:off x="4243605" y="2766025"/>
+            <a:ext cx="369405" cy="637090"/>
+          </a:xfrm>
+          <a:prstGeom prst="rect">
+            <a:avLst/>
+          </a:prstGeom>
+        </p:spPr>
+      </p:pic>
+      <p:sp>
+        <p:nvSpPr>
+          <p:cNvPr id="16" name="TextBox 15"/>
+          <p:cNvSpPr txBox="1"/>
+          <p:nvPr/>
+        </p:nvSpPr>
+        <p:spPr>
+          <a:xfrm>
+            <a:off x="4277464" y="2779088"/>
+            <a:ext cx="312906" cy="369332"/>
+          </a:xfrm>
+          <a:prstGeom prst="rect">
+            <a:avLst/>
+          </a:prstGeom>
+          <a:noFill/>
+        </p:spPr>
+        <p:txBody>
+          <a:bodyPr wrap="none" rtlCol="0">
+            <a:spAutoFit/>
+          </a:bodyPr>
+          <a:lstStyle/>
+          <a:p>
+            <a:r>
+              <a:rPr lang="en-US" dirty="0" smtClean="0">
+                <a:solidFill>
+                  <a:schemeClr val="bg1"/>
+                </a:solidFill>
+                <a:latin typeface="Impact" panose="020B0806030902050204" pitchFamily="34" charset="0"/>
+              </a:rPr>
+              <a:t>B</a:t>
+            </a:r>
+            <a:endParaRPr lang="en-US" dirty="0">
+              <a:solidFill>
+                <a:schemeClr val="bg1"/>
+              </a:solidFill>
+              <a:latin typeface="Impact" panose="020B0806030902050204" pitchFamily="34" charset="0"/>
+            </a:endParaRPr>
+          </a:p>
+        </p:txBody>
+      </p:sp>
+      <p:pic>
+        <p:nvPicPr>
+          <p:cNvPr id="18" name="Picture 17"/>
+          <p:cNvPicPr>
+            <a:picLocks noChangeAspect="1"/>
+          </p:cNvPicPr>
+          <p:nvPr/>
+        </p:nvPicPr>
+        <p:blipFill>
+          <a:blip r:embed="rId4">
+            <a:extLst>
+              <a:ext uri="{28A0092B-C50C-407E-A947-70E740481C1C}">
+                <a14:useLocalDpi xmlns:a14="http://schemas.microsoft.com/office/drawing/2010/main" val="0"/>
+              </a:ext>
+            </a:extLst>
+          </a:blip>
+          <a:stretch>
+            <a:fillRect/>
+          </a:stretch>
+        </p:blipFill>
+        <p:spPr>
+          <a:xfrm>
+            <a:off x="4243605" y="4012214"/>
+            <a:ext cx="369405" cy="637090"/>
+          </a:xfrm>
+          <a:prstGeom prst="rect">
+            <a:avLst/>
+          </a:prstGeom>
+        </p:spPr>
+      </p:pic>
+      <p:sp>
+        <p:nvSpPr>
+          <p:cNvPr id="20" name="TextBox 19"/>
+          <p:cNvSpPr txBox="1"/>
+          <p:nvPr/>
+        </p:nvSpPr>
+        <p:spPr>
+          <a:xfrm>
+            <a:off x="4277464" y="4012214"/>
+            <a:ext cx="312906" cy="369332"/>
+          </a:xfrm>
+          <a:prstGeom prst="rect">
+            <a:avLst/>
+          </a:prstGeom>
+          <a:noFill/>
+        </p:spPr>
+        <p:txBody>
+          <a:bodyPr wrap="none" rtlCol="0">
+            <a:spAutoFit/>
+          </a:bodyPr>
+          <a:lstStyle/>
+          <a:p>
+            <a:r>
+              <a:rPr lang="en-US" dirty="0" smtClean="0">
+                <a:solidFill>
+                  <a:schemeClr val="bg1"/>
+                </a:solidFill>
+                <a:latin typeface="Impact" panose="020B0806030902050204" pitchFamily="34" charset="0"/>
+              </a:rPr>
+              <a:t>C</a:t>
+            </a:r>
+            <a:endParaRPr lang="en-US" dirty="0">
+              <a:solidFill>
+                <a:schemeClr val="bg1"/>
+              </a:solidFill>
+              <a:latin typeface="Impact" panose="020B0806030902050204" pitchFamily="34" charset="0"/>
+            </a:endParaRPr>
+          </a:p>
+        </p:txBody>
+      </p:sp>
+      <p:sp>
+        <p:nvSpPr>
+          <p:cNvPr id="21" name="TextBox 20"/>
+          <p:cNvSpPr txBox="1"/>
+          <p:nvPr/>
+        </p:nvSpPr>
+        <p:spPr>
+          <a:xfrm>
+            <a:off x="4702628" y="1568986"/>
+            <a:ext cx="3095912" cy="461665"/>
+          </a:xfrm>
+          <a:prstGeom prst="rect">
+            <a:avLst/>
+          </a:prstGeom>
+          <a:noFill/>
+        </p:spPr>
+        <p:txBody>
+          <a:bodyPr wrap="none" rtlCol="0">
+            <a:spAutoFit/>
+          </a:bodyPr>
+          <a:lstStyle/>
+          <a:p>
+            <a:r>
+              <a:rPr lang="en-US" sz="2400" b="1" dirty="0" smtClean="0">
+                <a:latin typeface="Calibri" panose="020F0502020204030204" pitchFamily="34" charset="0"/>
+              </a:rPr>
+              <a:t>The Cheese </a:t>
+            </a:r>
+            <a:r>
+              <a:rPr lang="en-US" sz="2400" b="1" dirty="0" err="1" smtClean="0">
+                <a:latin typeface="Calibri" panose="020F0502020204030204" pitchFamily="34" charset="0"/>
+              </a:rPr>
+              <a:t>Prata</a:t>
+            </a:r>
+            <a:r>
+              <a:rPr lang="en-US" sz="2400" b="1" dirty="0" smtClean="0">
+                <a:latin typeface="Calibri" panose="020F0502020204030204" pitchFamily="34" charset="0"/>
+              </a:rPr>
+              <a:t> Shop</a:t>
+            </a:r>
+            <a:endParaRPr lang="en-US" sz="2400" b="1" dirty="0">
+              <a:latin typeface="Calibri" panose="020F0502020204030204" pitchFamily="34" charset="0"/>
+            </a:endParaRPr>
+          </a:p>
+        </p:txBody>
+      </p:sp>
+      <p:sp>
+        <p:nvSpPr>
+          <p:cNvPr id="22" name="TextBox 21"/>
+          <p:cNvSpPr txBox="1"/>
+          <p:nvPr/>
+        </p:nvSpPr>
+        <p:spPr>
+          <a:xfrm>
+            <a:off x="4702628" y="4099926"/>
+            <a:ext cx="3015184" cy="461665"/>
+          </a:xfrm>
+          <a:prstGeom prst="rect">
+            <a:avLst/>
+          </a:prstGeom>
+          <a:noFill/>
+        </p:spPr>
+        <p:txBody>
+          <a:bodyPr wrap="none" rtlCol="0">
+            <a:spAutoFit/>
+          </a:bodyPr>
+          <a:lstStyle/>
+          <a:p>
+            <a:r>
+              <a:rPr lang="en-US" sz="2400" b="1" dirty="0" smtClean="0">
+                <a:latin typeface="Calibri" panose="020F0502020204030204" pitchFamily="34" charset="0"/>
+              </a:rPr>
+              <a:t>The University Lounge</a:t>
+            </a:r>
+            <a:endParaRPr lang="en-US" sz="2400" b="1" dirty="0">
+              <a:latin typeface="Calibri" panose="020F0502020204030204" pitchFamily="34" charset="0"/>
+            </a:endParaRPr>
+          </a:p>
+        </p:txBody>
+      </p:sp>
+      <p:sp>
+        <p:nvSpPr>
+          <p:cNvPr id="12" name="TextBox 11"/>
+          <p:cNvSpPr txBox="1"/>
+          <p:nvPr/>
+        </p:nvSpPr>
+        <p:spPr>
+          <a:xfrm>
+            <a:off x="4813534" y="1971493"/>
+            <a:ext cx="2985006" cy="738664"/>
+          </a:xfrm>
+          <a:prstGeom prst="rect">
+            <a:avLst/>
+          </a:prstGeom>
+          <a:noFill/>
+        </p:spPr>
+        <p:txBody>
+          <a:bodyPr wrap="square" rtlCol="0">
+            <a:spAutoFit/>
+          </a:bodyPr>
+          <a:lstStyle/>
+          <a:p>
+            <a:r>
+              <a:rPr lang="en-US" sz="1400" dirty="0" smtClean="0">
+                <a:latin typeface="Calibri" panose="020F0502020204030204" pitchFamily="34" charset="0"/>
+              </a:rPr>
+              <a:t>18 </a:t>
+            </a:r>
+            <a:r>
+              <a:rPr lang="en-US" sz="1400" dirty="0" err="1">
+                <a:latin typeface="Calibri" panose="020F0502020204030204" pitchFamily="34" charset="0"/>
+              </a:rPr>
+              <a:t>Clementi</a:t>
+            </a:r>
+            <a:r>
+              <a:rPr lang="en-US" sz="1400" dirty="0">
+                <a:latin typeface="Calibri" panose="020F0502020204030204" pitchFamily="34" charset="0"/>
+              </a:rPr>
+              <a:t> Rd, Singapore </a:t>
+            </a:r>
+            <a:r>
+              <a:rPr lang="en-US" sz="1400" dirty="0" smtClean="0">
+                <a:latin typeface="Calibri" panose="020F0502020204030204" pitchFamily="34" charset="0"/>
+              </a:rPr>
+              <a:t>129747</a:t>
+            </a:r>
+          </a:p>
+          <a:p>
+            <a:r>
+              <a:rPr lang="en-US" sz="1400" dirty="0" smtClean="0">
+                <a:latin typeface="Calibri" panose="020F0502020204030204" pitchFamily="34" charset="0"/>
+              </a:rPr>
+              <a:t>+65 6872 1030</a:t>
+            </a:r>
+          </a:p>
+          <a:p>
+            <a:r>
+              <a:rPr lang="en-US" sz="1400" dirty="0">
+                <a:solidFill>
+                  <a:schemeClr val="tx1">
+                    <a:lumMod val="75000"/>
+                  </a:schemeClr>
+                </a:solidFill>
+                <a:latin typeface="Calibri" panose="020F0502020204030204" pitchFamily="34" charset="0"/>
+              </a:rPr>
+              <a:t>627m </a:t>
+            </a:r>
+            <a:r>
+              <a:rPr lang="en-US" sz="1400" dirty="0" smtClean="0">
+                <a:solidFill>
+                  <a:schemeClr val="tx1">
+                    <a:lumMod val="75000"/>
+                  </a:schemeClr>
+                </a:solidFill>
+                <a:latin typeface="Calibri" panose="020F0502020204030204" pitchFamily="34" charset="0"/>
+              </a:rPr>
+              <a:t>West</a:t>
+            </a:r>
+          </a:p>
+        </p:txBody>
+      </p:sp>
+      <p:sp>
+        <p:nvSpPr>
+          <p:cNvPr id="25" name="TextBox 24"/>
+          <p:cNvSpPr txBox="1"/>
+          <p:nvPr/>
+        </p:nvSpPr>
+        <p:spPr>
+          <a:xfrm>
+            <a:off x="4807778" y="3216120"/>
+            <a:ext cx="2985006" cy="738664"/>
+          </a:xfrm>
+          <a:prstGeom prst="rect">
+            <a:avLst/>
+          </a:prstGeom>
+          <a:noFill/>
+        </p:spPr>
+        <p:txBody>
+          <a:bodyPr wrap="square" rtlCol="0">
+            <a:spAutoFit/>
+          </a:bodyPr>
+          <a:lstStyle/>
+          <a:p>
+            <a:r>
+              <a:rPr lang="en-US" sz="1400" dirty="0" smtClean="0">
+                <a:latin typeface="Calibri" panose="020F0502020204030204" pitchFamily="34" charset="0"/>
+              </a:rPr>
+              <a:t>12 </a:t>
+            </a:r>
+            <a:r>
+              <a:rPr lang="en-US" sz="1400" dirty="0" err="1">
+                <a:latin typeface="Calibri" panose="020F0502020204030204" pitchFamily="34" charset="0"/>
+              </a:rPr>
+              <a:t>Clementi</a:t>
+            </a:r>
+            <a:r>
+              <a:rPr lang="en-US" sz="1400" dirty="0">
+                <a:latin typeface="Calibri" panose="020F0502020204030204" pitchFamily="34" charset="0"/>
+              </a:rPr>
+              <a:t> Rd, Singapore </a:t>
+            </a:r>
+            <a:r>
+              <a:rPr lang="en-US" sz="1400" dirty="0" smtClean="0">
+                <a:latin typeface="Calibri" panose="020F0502020204030204" pitchFamily="34" charset="0"/>
+              </a:rPr>
+              <a:t>129742</a:t>
+            </a:r>
+          </a:p>
+          <a:p>
+            <a:r>
+              <a:rPr lang="en-US" sz="1400" dirty="0" smtClean="0">
+                <a:latin typeface="Calibri" panose="020F0502020204030204" pitchFamily="34" charset="0"/>
+              </a:rPr>
+              <a:t>+65 6774 0637</a:t>
+            </a:r>
+          </a:p>
+          <a:p>
+            <a:r>
+              <a:rPr lang="en-US" sz="1400" dirty="0" smtClean="0">
+                <a:solidFill>
+                  <a:schemeClr val="tx1">
+                    <a:lumMod val="75000"/>
+                  </a:schemeClr>
+                </a:solidFill>
+                <a:latin typeface="Calibri" panose="020F0502020204030204" pitchFamily="34" charset="0"/>
+              </a:rPr>
+              <a:t>650m South-West</a:t>
+            </a:r>
+          </a:p>
+        </p:txBody>
+      </p:sp>
+      <p:sp>
+        <p:nvSpPr>
+          <p:cNvPr id="26" name="TextBox 25"/>
+          <p:cNvSpPr txBox="1"/>
+          <p:nvPr/>
+        </p:nvSpPr>
+        <p:spPr>
+          <a:xfrm>
+            <a:off x="4801268" y="4486873"/>
+            <a:ext cx="2985006" cy="954107"/>
+          </a:xfrm>
+          <a:prstGeom prst="rect">
+            <a:avLst/>
+          </a:prstGeom>
+          <a:noFill/>
+        </p:spPr>
+        <p:txBody>
+          <a:bodyPr wrap="square" rtlCol="0">
+            <a:spAutoFit/>
+          </a:bodyPr>
+          <a:lstStyle/>
+          <a:p>
+            <a:r>
+              <a:rPr lang="en-US" sz="1400" dirty="0"/>
+              <a:t>11 Kent Ridge Drive, Shaw Foundation Alumni House 4/L, </a:t>
+            </a:r>
+            <a:r>
+              <a:rPr lang="en-US" sz="1400" dirty="0" smtClean="0"/>
+              <a:t>119244</a:t>
+            </a:r>
+          </a:p>
+          <a:p>
+            <a:r>
+              <a:rPr lang="en-US" sz="1400" dirty="0" smtClean="0">
+                <a:latin typeface="Calibri" panose="020F0502020204030204" pitchFamily="34" charset="0"/>
+              </a:rPr>
+              <a:t>+65 6779 8919</a:t>
+            </a:r>
+          </a:p>
+          <a:p>
+            <a:r>
+              <a:rPr lang="en-US" sz="1400" dirty="0" smtClean="0">
+                <a:solidFill>
+                  <a:schemeClr val="tx1">
+                    <a:lumMod val="75000"/>
+                  </a:schemeClr>
+                </a:solidFill>
+                <a:latin typeface="Calibri" panose="020F0502020204030204" pitchFamily="34" charset="0"/>
+              </a:rPr>
+              <a:t>230m South</a:t>
+            </a:r>
+          </a:p>
+        </p:txBody>
+      </p:sp>
+    </p:spTree>
+    <p:extLst>
+      <p:ext uri="{BB962C8B-B14F-4D97-AF65-F5344CB8AC3E}">
+        <p14:creationId xmlns:p14="http://schemas.microsoft.com/office/powerpoint/2010/main" val="2933613461"/>
+      </p:ext>
+    </p:extLst>
+  </p:cSld>
+  <p:clrMapOvr>
+    <a:masterClrMapping/>
+  </p:clrMapOvr>
+  <p:transition spd="slow">
+    <p:wipe/>
+  </p:transition>
+  <p:timing>
+    <p:tnLst>
+      <p:par>
+        <p:cTn id="1" dur="indefinite" restart="never" nodeType="tmRoot"/>
+      </p:par>
+    </p:tnLst>
   </p:timing>
 </p:sld>
 </file>

</xml_diff>

<commit_message>
Hello IAN edited CSS and Index.html
</commit_message>
<xml_diff>
--- a/Hungry Go THERE.pptx
+++ b/Hungry Go THERE.pptx
@@ -13,7 +13,7 @@
     <p:sldId id="261" r:id="rId7"/>
     <p:sldId id="262" r:id="rId8"/>
     <p:sldId id="276" r:id="rId9"/>
-    <p:sldId id="277" r:id="rId10"/>
+    <p:sldId id="279" r:id="rId10"/>
     <p:sldId id="278" r:id="rId11"/>
     <p:sldId id="263" r:id="rId12"/>
     <p:sldId id="264" r:id="rId13"/>
@@ -21,6 +21,8 @@
     <p:sldId id="269" r:id="rId15"/>
     <p:sldId id="267" r:id="rId16"/>
     <p:sldId id="268" r:id="rId17"/>
+    <p:sldId id="280" r:id="rId18"/>
+    <p:sldId id="281" r:id="rId19"/>
   </p:sldIdLst>
   <p:sldSz cx="12192000" cy="6858000"/>
   <p:notesSz cx="6858000" cy="9144000"/>
@@ -308,7 +310,7 @@
           <a:p>
             <a:fld id="{96DFF08F-DC6B-4601-B491-B0F83F6DD2DA}" type="datetimeFigureOut">
               <a:rPr lang="en-US" dirty="0"/>
-              <a:t>5/26/2013</a:t>
+              <a:t>5/28/2013</a:t>
             </a:fld>
             <a:endParaRPr lang="en-US" dirty="0"/>
           </a:p>
@@ -473,7 +475,7 @@
           <a:p>
             <a:fld id="{96DFF08F-DC6B-4601-B491-B0F83F6DD2DA}" type="datetimeFigureOut">
               <a:rPr lang="en-US" dirty="0"/>
-              <a:t>5/26/2013</a:t>
+              <a:t>5/28/2013</a:t>
             </a:fld>
             <a:endParaRPr lang="en-US" dirty="0"/>
           </a:p>
@@ -691,7 +693,7 @@
           <a:p>
             <a:fld id="{96DFF08F-DC6B-4601-B491-B0F83F6DD2DA}" type="datetimeFigureOut">
               <a:rPr lang="en-US" dirty="0"/>
-              <a:t>5/26/2013</a:t>
+              <a:t>5/28/2013</a:t>
             </a:fld>
             <a:endParaRPr lang="en-US" dirty="0"/>
           </a:p>
@@ -866,7 +868,7 @@
           <a:p>
             <a:fld id="{96DFF08F-DC6B-4601-B491-B0F83F6DD2DA}" type="datetimeFigureOut">
               <a:rPr lang="en-US" dirty="0"/>
-              <a:t>5/26/2013</a:t>
+              <a:t>5/28/2013</a:t>
             </a:fld>
             <a:endParaRPr lang="en-US" dirty="0"/>
           </a:p>
@@ -1168,7 +1170,7 @@
             <a:fld id="{96DFF08F-DC6B-4601-B491-B0F83F6DD2DA}" type="datetimeFigureOut">
               <a:rPr lang="en-US" dirty="0"/>
               <a:pPr/>
-              <a:t>5/26/2013</a:t>
+              <a:t>5/28/2013</a:t>
             </a:fld>
             <a:endParaRPr lang="en-US" dirty="0"/>
           </a:p>
@@ -1468,7 +1470,7 @@
           <a:p>
             <a:fld id="{96DFF08F-DC6B-4601-B491-B0F83F6DD2DA}" type="datetimeFigureOut">
               <a:rPr lang="en-US" dirty="0"/>
-              <a:t>5/26/2013</a:t>
+              <a:t>5/28/2013</a:t>
             </a:fld>
             <a:endParaRPr lang="en-US" dirty="0"/>
           </a:p>
@@ -1885,7 +1887,7 @@
           <a:p>
             <a:fld id="{96DFF08F-DC6B-4601-B491-B0F83F6DD2DA}" type="datetimeFigureOut">
               <a:rPr lang="en-US" dirty="0"/>
-              <a:t>5/26/2013</a:t>
+              <a:t>5/28/2013</a:t>
             </a:fld>
             <a:endParaRPr lang="en-US" dirty="0"/>
           </a:p>
@@ -1998,7 +2000,7 @@
           <a:p>
             <a:fld id="{96DFF08F-DC6B-4601-B491-B0F83F6DD2DA}" type="datetimeFigureOut">
               <a:rPr lang="en-US" dirty="0"/>
-              <a:t>5/26/2013</a:t>
+              <a:t>5/28/2013</a:t>
             </a:fld>
             <a:endParaRPr lang="en-US" dirty="0"/>
           </a:p>
@@ -2088,7 +2090,7 @@
           <a:p>
             <a:fld id="{96DFF08F-DC6B-4601-B491-B0F83F6DD2DA}" type="datetimeFigureOut">
               <a:rPr lang="en-US" dirty="0"/>
-              <a:t>5/26/2013</a:t>
+              <a:t>5/28/2013</a:t>
             </a:fld>
             <a:endParaRPr lang="en-US" dirty="0"/>
           </a:p>
@@ -2356,7 +2358,7 @@
           <a:p>
             <a:fld id="{96DFF08F-DC6B-4601-B491-B0F83F6DD2DA}" type="datetimeFigureOut">
               <a:rPr lang="en-US" dirty="0"/>
-              <a:t>5/26/2013</a:t>
+              <a:t>5/28/2013</a:t>
             </a:fld>
             <a:endParaRPr lang="en-US" dirty="0"/>
           </a:p>
@@ -2616,7 +2618,7 @@
           <a:p>
             <a:fld id="{96DFF08F-DC6B-4601-B491-B0F83F6DD2DA}" type="datetimeFigureOut">
               <a:rPr lang="en-US" dirty="0"/>
-              <a:t>5/26/2013</a:t>
+              <a:t>5/28/2013</a:t>
             </a:fld>
             <a:endParaRPr lang="en-US" dirty="0"/>
           </a:p>
@@ -2861,7 +2863,7 @@
             <a:fld id="{96DFF08F-DC6B-4601-B491-B0F83F6DD2DA}" type="datetimeFigureOut">
               <a:rPr lang="en-US" dirty="0"/>
               <a:pPr/>
-              <a:t>5/26/2013</a:t>
+              <a:t>5/28/2013</a:t>
             </a:fld>
             <a:endParaRPr lang="en-US" dirty="0"/>
           </a:p>
@@ -8056,7 +8058,9 @@
       </p:pic>
       <p:pic>
         <p:nvPicPr>
-          <p:cNvPr id="12" name="Picture 11"/>
+          <p:cNvPr id="12" name="Picture 11">
+            <a:hlinkClick r:id="rId6" action="ppaction://hlinksldjump"/>
+          </p:cNvPr>
           <p:cNvPicPr>
             <a:picLocks noChangeAspect="1"/>
           </p:cNvPicPr>
@@ -9192,6 +9196,913 @@
   <p:transition spd="slow">
     <p:wipe/>
   </p:transition>
+  <p:timing>
+    <p:tnLst>
+      <p:par>
+        <p:cTn id="1" dur="indefinite" restart="never" nodeType="tmRoot"/>
+      </p:par>
+    </p:tnLst>
+  </p:timing>
+</p:sld>
+</file>
+
+<file path=ppt/slides/slide17.xml><?xml version="1.0" encoding="utf-8"?>
+<p:sld xmlns:a="http://schemas.openxmlformats.org/drawingml/2006/main" xmlns:r="http://schemas.openxmlformats.org/officeDocument/2006/relationships" xmlns:p="http://schemas.openxmlformats.org/presentationml/2006/main">
+  <p:cSld>
+    <p:spTree>
+      <p:nvGrpSpPr>
+        <p:cNvPr id="1" name=""/>
+        <p:cNvGrpSpPr/>
+        <p:nvPr/>
+      </p:nvGrpSpPr>
+      <p:grpSpPr>
+        <a:xfrm>
+          <a:off x="0" y="0"/>
+          <a:ext cx="0" cy="0"/>
+          <a:chOff x="0" y="0"/>
+          <a:chExt cx="0" cy="0"/>
+        </a:xfrm>
+      </p:grpSpPr>
+      <p:sp>
+        <p:nvSpPr>
+          <p:cNvPr id="4" name="Rounded Rectangle 3"/>
+          <p:cNvSpPr/>
+          <p:nvPr/>
+        </p:nvSpPr>
+        <p:spPr>
+          <a:xfrm>
+            <a:off x="3854823" y="89649"/>
+            <a:ext cx="4320989" cy="6696635"/>
+          </a:xfrm>
+          <a:prstGeom prst="roundRect">
+            <a:avLst/>
+          </a:prstGeom>
+          <a:solidFill>
+            <a:schemeClr val="tx1">
+              <a:lumMod val="95000"/>
+            </a:schemeClr>
+          </a:solidFill>
+          <a:ln>
+            <a:solidFill>
+              <a:schemeClr val="bg1">
+                <a:lumMod val="95000"/>
+                <a:lumOff val="5000"/>
+              </a:schemeClr>
+            </a:solidFill>
+          </a:ln>
+        </p:spPr>
+        <p:style>
+          <a:lnRef idx="2">
+            <a:schemeClr val="accent1">
+              <a:shade val="50000"/>
+            </a:schemeClr>
+          </a:lnRef>
+          <a:fillRef idx="1">
+            <a:schemeClr val="accent1"/>
+          </a:fillRef>
+          <a:effectRef idx="0">
+            <a:schemeClr val="accent1"/>
+          </a:effectRef>
+          <a:fontRef idx="minor">
+            <a:schemeClr val="lt1"/>
+          </a:fontRef>
+        </p:style>
+        <p:txBody>
+          <a:bodyPr rtlCol="0" anchor="ctr"/>
+          <a:lstStyle/>
+          <a:p>
+            <a:pPr algn="ctr"/>
+            <a:endParaRPr lang="en-US"/>
+          </a:p>
+        </p:txBody>
+      </p:sp>
+      <p:sp>
+        <p:nvSpPr>
+          <p:cNvPr id="6" name="Rectangle 5"/>
+          <p:cNvSpPr/>
+          <p:nvPr/>
+        </p:nvSpPr>
+        <p:spPr>
+          <a:xfrm>
+            <a:off x="4043081" y="806820"/>
+            <a:ext cx="3944471" cy="4876800"/>
+          </a:xfrm>
+          <a:prstGeom prst="rect">
+            <a:avLst/>
+          </a:prstGeom>
+          <a:solidFill>
+            <a:schemeClr val="bg1">
+              <a:lumMod val="85000"/>
+              <a:lumOff val="15000"/>
+            </a:schemeClr>
+          </a:solidFill>
+          <a:ln>
+            <a:solidFill>
+              <a:schemeClr val="bg1"/>
+            </a:solidFill>
+          </a:ln>
+        </p:spPr>
+        <p:style>
+          <a:lnRef idx="2">
+            <a:schemeClr val="accent1">
+              <a:shade val="50000"/>
+            </a:schemeClr>
+          </a:lnRef>
+          <a:fillRef idx="1">
+            <a:schemeClr val="accent1"/>
+          </a:fillRef>
+          <a:effectRef idx="0">
+            <a:schemeClr val="accent1"/>
+          </a:effectRef>
+          <a:fontRef idx="minor">
+            <a:schemeClr val="lt1"/>
+          </a:fontRef>
+        </p:style>
+        <p:txBody>
+          <a:bodyPr rtlCol="0" anchor="ctr"/>
+          <a:lstStyle/>
+          <a:p>
+            <a:pPr algn="ctr"/>
+            <a:endParaRPr lang="en-US" sz="3200" dirty="0"/>
+          </a:p>
+        </p:txBody>
+      </p:sp>
+      <p:sp>
+        <p:nvSpPr>
+          <p:cNvPr id="7" name="Rectangle 6"/>
+          <p:cNvSpPr/>
+          <p:nvPr/>
+        </p:nvSpPr>
+        <p:spPr>
+          <a:xfrm>
+            <a:off x="5504327" y="376517"/>
+            <a:ext cx="1021977" cy="71718"/>
+          </a:xfrm>
+          <a:prstGeom prst="rect">
+            <a:avLst/>
+          </a:prstGeom>
+          <a:solidFill>
+            <a:schemeClr val="bg1"/>
+          </a:solidFill>
+          <a:ln>
+            <a:solidFill>
+              <a:schemeClr val="bg1"/>
+            </a:solidFill>
+          </a:ln>
+        </p:spPr>
+        <p:style>
+          <a:lnRef idx="2">
+            <a:schemeClr val="accent1">
+              <a:shade val="50000"/>
+            </a:schemeClr>
+          </a:lnRef>
+          <a:fillRef idx="1">
+            <a:schemeClr val="accent1"/>
+          </a:fillRef>
+          <a:effectRef idx="0">
+            <a:schemeClr val="accent1"/>
+          </a:effectRef>
+          <a:fontRef idx="minor">
+            <a:schemeClr val="lt1"/>
+          </a:fontRef>
+        </p:style>
+        <p:txBody>
+          <a:bodyPr rtlCol="0" anchor="ctr"/>
+          <a:lstStyle/>
+          <a:p>
+            <a:pPr algn="ctr"/>
+            <a:endParaRPr lang="en-US"/>
+          </a:p>
+        </p:txBody>
+      </p:sp>
+      <p:sp>
+        <p:nvSpPr>
+          <p:cNvPr id="8" name="Oval 7"/>
+          <p:cNvSpPr/>
+          <p:nvPr/>
+        </p:nvSpPr>
+        <p:spPr>
+          <a:xfrm>
+            <a:off x="5674655" y="5894292"/>
+            <a:ext cx="681320" cy="681320"/>
+          </a:xfrm>
+          <a:prstGeom prst="ellipse">
+            <a:avLst/>
+          </a:prstGeom>
+          <a:solidFill>
+            <a:schemeClr val="tx1">
+              <a:lumMod val="95000"/>
+            </a:schemeClr>
+          </a:solidFill>
+          <a:ln>
+            <a:solidFill>
+              <a:schemeClr val="bg1"/>
+            </a:solidFill>
+          </a:ln>
+        </p:spPr>
+        <p:style>
+          <a:lnRef idx="2">
+            <a:schemeClr val="accent1">
+              <a:shade val="50000"/>
+            </a:schemeClr>
+          </a:lnRef>
+          <a:fillRef idx="1">
+            <a:schemeClr val="accent1"/>
+          </a:fillRef>
+          <a:effectRef idx="0">
+            <a:schemeClr val="accent1"/>
+          </a:effectRef>
+          <a:fontRef idx="minor">
+            <a:schemeClr val="lt1"/>
+          </a:fontRef>
+        </p:style>
+        <p:txBody>
+          <a:bodyPr rtlCol="0" anchor="ctr"/>
+          <a:lstStyle/>
+          <a:p>
+            <a:pPr algn="ctr"/>
+            <a:endParaRPr lang="en-US"/>
+          </a:p>
+        </p:txBody>
+      </p:sp>
+      <p:sp>
+        <p:nvSpPr>
+          <p:cNvPr id="9" name="Oval 8"/>
+          <p:cNvSpPr/>
+          <p:nvPr/>
+        </p:nvSpPr>
+        <p:spPr>
+          <a:xfrm>
+            <a:off x="5800163" y="6019800"/>
+            <a:ext cx="430304" cy="430304"/>
+          </a:xfrm>
+          <a:prstGeom prst="ellipse">
+            <a:avLst/>
+          </a:prstGeom>
+          <a:solidFill>
+            <a:schemeClr val="tx1">
+              <a:lumMod val="95000"/>
+            </a:schemeClr>
+          </a:solidFill>
+          <a:ln>
+            <a:solidFill>
+              <a:schemeClr val="bg1"/>
+            </a:solidFill>
+          </a:ln>
+        </p:spPr>
+        <p:style>
+          <a:lnRef idx="2">
+            <a:schemeClr val="accent1">
+              <a:shade val="50000"/>
+            </a:schemeClr>
+          </a:lnRef>
+          <a:fillRef idx="1">
+            <a:schemeClr val="accent1"/>
+          </a:fillRef>
+          <a:effectRef idx="0">
+            <a:schemeClr val="accent1"/>
+          </a:effectRef>
+          <a:fontRef idx="minor">
+            <a:schemeClr val="lt1"/>
+          </a:fontRef>
+        </p:style>
+        <p:txBody>
+          <a:bodyPr rtlCol="0" anchor="ctr"/>
+          <a:lstStyle/>
+          <a:p>
+            <a:pPr algn="ctr"/>
+            <a:endParaRPr lang="en-US"/>
+          </a:p>
+        </p:txBody>
+      </p:sp>
+      <p:sp>
+        <p:nvSpPr>
+          <p:cNvPr id="17" name="Rounded Rectangle 16">
+            <a:hlinkClick r:id="rId2" action="ppaction://hlinksldjump"/>
+          </p:cNvPr>
+          <p:cNvSpPr/>
+          <p:nvPr/>
+        </p:nvSpPr>
+        <p:spPr>
+          <a:xfrm>
+            <a:off x="4153988" y="916836"/>
+            <a:ext cx="548640" cy="204374"/>
+          </a:xfrm>
+          <a:prstGeom prst="roundRect">
+            <a:avLst/>
+          </a:prstGeom>
+          <a:solidFill>
+            <a:schemeClr val="accent2"/>
+          </a:solidFill>
+        </p:spPr>
+        <p:style>
+          <a:lnRef idx="2">
+            <a:schemeClr val="accent1">
+              <a:shade val="50000"/>
+            </a:schemeClr>
+          </a:lnRef>
+          <a:fillRef idx="1">
+            <a:schemeClr val="accent1"/>
+          </a:fillRef>
+          <a:effectRef idx="0">
+            <a:schemeClr val="accent1"/>
+          </a:effectRef>
+          <a:fontRef idx="minor">
+            <a:schemeClr val="lt1"/>
+          </a:fontRef>
+        </p:style>
+        <p:txBody>
+          <a:bodyPr rtlCol="0" anchor="ctr"/>
+          <a:lstStyle/>
+          <a:p>
+            <a:pPr algn="ctr"/>
+            <a:r>
+              <a:rPr lang="en-US" sz="1200" dirty="0" smtClean="0"/>
+              <a:t>Back</a:t>
+            </a:r>
+            <a:endParaRPr lang="en-US" sz="1200" dirty="0"/>
+          </a:p>
+        </p:txBody>
+      </p:sp>
+      <p:sp>
+        <p:nvSpPr>
+          <p:cNvPr id="21" name="TextBox 20"/>
+          <p:cNvSpPr txBox="1"/>
+          <p:nvPr/>
+        </p:nvSpPr>
+        <p:spPr>
+          <a:xfrm>
+            <a:off x="4105080" y="1350125"/>
+            <a:ext cx="2085251" cy="553998"/>
+          </a:xfrm>
+          <a:prstGeom prst="rect">
+            <a:avLst/>
+          </a:prstGeom>
+          <a:noFill/>
+        </p:spPr>
+        <p:txBody>
+          <a:bodyPr wrap="none" rtlCol="0">
+            <a:spAutoFit/>
+          </a:bodyPr>
+          <a:lstStyle/>
+          <a:p>
+            <a:r>
+              <a:rPr lang="en-US" sz="3000" b="1" dirty="0" err="1" smtClean="0">
+                <a:latin typeface="Calibri" panose="020F0502020204030204" pitchFamily="34" charset="0"/>
+              </a:rPr>
+              <a:t>Botak</a:t>
+            </a:r>
+            <a:r>
+              <a:rPr lang="en-US" sz="3000" b="1" dirty="0" smtClean="0">
+                <a:latin typeface="Calibri" panose="020F0502020204030204" pitchFamily="34" charset="0"/>
+              </a:rPr>
+              <a:t> Jones</a:t>
+            </a:r>
+            <a:endParaRPr lang="en-US" sz="3000" b="1" dirty="0">
+              <a:latin typeface="Calibri" panose="020F0502020204030204" pitchFamily="34" charset="0"/>
+            </a:endParaRPr>
+          </a:p>
+        </p:txBody>
+      </p:sp>
+      <p:sp>
+        <p:nvSpPr>
+          <p:cNvPr id="12" name="TextBox 11"/>
+          <p:cNvSpPr txBox="1"/>
+          <p:nvPr/>
+        </p:nvSpPr>
+        <p:spPr>
+          <a:xfrm>
+            <a:off x="4153988" y="1799217"/>
+            <a:ext cx="3703830" cy="954107"/>
+          </a:xfrm>
+          <a:prstGeom prst="rect">
+            <a:avLst/>
+          </a:prstGeom>
+          <a:noFill/>
+        </p:spPr>
+        <p:txBody>
+          <a:bodyPr wrap="square" rtlCol="0">
+            <a:spAutoFit/>
+          </a:bodyPr>
+          <a:lstStyle/>
+          <a:p>
+            <a:r>
+              <a:rPr lang="en-US" sz="1400" dirty="0">
+                <a:latin typeface="Calibri" panose="020F0502020204030204" pitchFamily="34" charset="0"/>
+              </a:rPr>
+              <a:t>325 </a:t>
+            </a:r>
+            <a:r>
+              <a:rPr lang="en-US" sz="1400" dirty="0" err="1">
+                <a:latin typeface="Calibri" panose="020F0502020204030204" pitchFamily="34" charset="0"/>
+              </a:rPr>
+              <a:t>Clementi</a:t>
+            </a:r>
+            <a:r>
+              <a:rPr lang="en-US" sz="1400" dirty="0">
+                <a:latin typeface="Calibri" panose="020F0502020204030204" pitchFamily="34" charset="0"/>
+              </a:rPr>
+              <a:t> Ave 5, #01-129, </a:t>
+            </a:r>
+            <a:endParaRPr lang="en-US" sz="1400" dirty="0" smtClean="0">
+              <a:latin typeface="Calibri" panose="020F0502020204030204" pitchFamily="34" charset="0"/>
+            </a:endParaRPr>
+          </a:p>
+          <a:p>
+            <a:r>
+              <a:rPr lang="en-US" sz="1400" dirty="0" smtClean="0">
+                <a:latin typeface="Calibri" panose="020F0502020204030204" pitchFamily="34" charset="0"/>
+              </a:rPr>
+              <a:t>Singapore </a:t>
+            </a:r>
+            <a:r>
+              <a:rPr lang="en-US" sz="1400" dirty="0">
+                <a:latin typeface="Calibri" panose="020F0502020204030204" pitchFamily="34" charset="0"/>
+              </a:rPr>
+              <a:t>120325</a:t>
+            </a:r>
+          </a:p>
+          <a:p>
+            <a:r>
+              <a:rPr lang="en-US" sz="1400" dirty="0">
+                <a:latin typeface="Calibri" panose="020F0502020204030204" pitchFamily="34" charset="0"/>
+              </a:rPr>
+              <a:t>+65 6774 1225</a:t>
+            </a:r>
+          </a:p>
+          <a:p>
+            <a:r>
+              <a:rPr lang="en-US" sz="1400" dirty="0">
+                <a:solidFill>
+                  <a:schemeClr val="tx1">
+                    <a:lumMod val="75000"/>
+                  </a:schemeClr>
+                </a:solidFill>
+                <a:latin typeface="Calibri" panose="020F0502020204030204" pitchFamily="34" charset="0"/>
+              </a:rPr>
+              <a:t>15min </a:t>
+            </a:r>
+            <a:r>
+              <a:rPr lang="en-US" sz="1400" dirty="0" smtClean="0">
+                <a:solidFill>
+                  <a:schemeClr val="tx1">
+                    <a:lumMod val="75000"/>
+                  </a:schemeClr>
+                </a:solidFill>
+                <a:latin typeface="Calibri" panose="020F0502020204030204" pitchFamily="34" charset="0"/>
+              </a:rPr>
+              <a:t>Detour</a:t>
+            </a:r>
+            <a:endParaRPr lang="en-US" sz="1400" dirty="0">
+              <a:solidFill>
+                <a:schemeClr val="tx1">
+                  <a:lumMod val="75000"/>
+                </a:schemeClr>
+              </a:solidFill>
+              <a:latin typeface="Calibri" panose="020F0502020204030204" pitchFamily="34" charset="0"/>
+            </a:endParaRPr>
+          </a:p>
+        </p:txBody>
+      </p:sp>
+      <p:sp>
+        <p:nvSpPr>
+          <p:cNvPr id="23" name="TextBox 22"/>
+          <p:cNvSpPr txBox="1"/>
+          <p:nvPr/>
+        </p:nvSpPr>
+        <p:spPr>
+          <a:xfrm>
+            <a:off x="4153988" y="2828489"/>
+            <a:ext cx="2547685" cy="369332"/>
+          </a:xfrm>
+          <a:prstGeom prst="rect">
+            <a:avLst/>
+          </a:prstGeom>
+          <a:noFill/>
+        </p:spPr>
+        <p:txBody>
+          <a:bodyPr wrap="none" rtlCol="0">
+            <a:spAutoFit/>
+          </a:bodyPr>
+          <a:lstStyle/>
+          <a:p>
+            <a:r>
+              <a:rPr lang="en-US" b="1" dirty="0" smtClean="0">
+                <a:latin typeface="Calibri" panose="020F0502020204030204" pitchFamily="34" charset="0"/>
+              </a:rPr>
+              <a:t>Estimated Waiting Times</a:t>
+            </a:r>
+            <a:endParaRPr lang="en-US" b="1" dirty="0">
+              <a:latin typeface="Calibri" panose="020F0502020204030204" pitchFamily="34" charset="0"/>
+            </a:endParaRPr>
+          </a:p>
+        </p:txBody>
+      </p:sp>
+      <p:sp>
+        <p:nvSpPr>
+          <p:cNvPr id="3" name="TextBox 2"/>
+          <p:cNvSpPr txBox="1"/>
+          <p:nvPr/>
+        </p:nvSpPr>
+        <p:spPr>
+          <a:xfrm>
+            <a:off x="4153988" y="3105057"/>
+            <a:ext cx="1385316" cy="523220"/>
+          </a:xfrm>
+          <a:prstGeom prst="rect">
+            <a:avLst/>
+          </a:prstGeom>
+          <a:noFill/>
+        </p:spPr>
+        <p:txBody>
+          <a:bodyPr wrap="none" rtlCol="0">
+            <a:spAutoFit/>
+          </a:bodyPr>
+          <a:lstStyle/>
+          <a:p>
+            <a:r>
+              <a:rPr lang="en-US" sz="1400" dirty="0" smtClean="0">
+                <a:latin typeface="Calibri" panose="020F0502020204030204" pitchFamily="34" charset="0"/>
+              </a:rPr>
+              <a:t>Queuing – </a:t>
+            </a:r>
+            <a:r>
+              <a:rPr lang="en-US" sz="1400" dirty="0">
+                <a:latin typeface="Calibri" panose="020F0502020204030204" pitchFamily="34" charset="0"/>
+              </a:rPr>
+              <a:t>5</a:t>
+            </a:r>
+            <a:r>
+              <a:rPr lang="en-US" sz="1400" dirty="0" smtClean="0">
+                <a:latin typeface="Calibri" panose="020F0502020204030204" pitchFamily="34" charset="0"/>
+              </a:rPr>
+              <a:t> </a:t>
+            </a:r>
+            <a:r>
+              <a:rPr lang="en-US" sz="1400" dirty="0" smtClean="0">
+                <a:latin typeface="Calibri" panose="020F0502020204030204" pitchFamily="34" charset="0"/>
+              </a:rPr>
+              <a:t>min</a:t>
+            </a:r>
+          </a:p>
+          <a:p>
+            <a:r>
+              <a:rPr lang="en-US" sz="1400" dirty="0" smtClean="0">
+                <a:latin typeface="Calibri" panose="020F0502020204030204" pitchFamily="34" charset="0"/>
+              </a:rPr>
+              <a:t>Serving </a:t>
+            </a:r>
+            <a:r>
+              <a:rPr lang="en-US" sz="1400" dirty="0" smtClean="0">
+                <a:latin typeface="Calibri" panose="020F0502020204030204" pitchFamily="34" charset="0"/>
+              </a:rPr>
+              <a:t>– </a:t>
+            </a:r>
+            <a:r>
+              <a:rPr lang="en-US" sz="1400" dirty="0" smtClean="0">
+                <a:latin typeface="Calibri" panose="020F0502020204030204" pitchFamily="34" charset="0"/>
+              </a:rPr>
+              <a:t>10 </a:t>
+            </a:r>
+            <a:r>
+              <a:rPr lang="en-US" sz="1400" dirty="0" smtClean="0">
+                <a:latin typeface="Calibri" panose="020F0502020204030204" pitchFamily="34" charset="0"/>
+              </a:rPr>
+              <a:t>min</a:t>
+            </a:r>
+            <a:endParaRPr lang="en-US" sz="1400" dirty="0">
+              <a:latin typeface="Calibri" panose="020F0502020204030204" pitchFamily="34" charset="0"/>
+            </a:endParaRPr>
+          </a:p>
+        </p:txBody>
+      </p:sp>
+      <p:sp>
+        <p:nvSpPr>
+          <p:cNvPr id="24" name="TextBox 23"/>
+          <p:cNvSpPr txBox="1"/>
+          <p:nvPr/>
+        </p:nvSpPr>
+        <p:spPr>
+          <a:xfrm>
+            <a:off x="4153988" y="3845619"/>
+            <a:ext cx="2658677" cy="369332"/>
+          </a:xfrm>
+          <a:prstGeom prst="rect">
+            <a:avLst/>
+          </a:prstGeom>
+          <a:noFill/>
+        </p:spPr>
+        <p:txBody>
+          <a:bodyPr wrap="none" rtlCol="0">
+            <a:spAutoFit/>
+          </a:bodyPr>
+          <a:lstStyle/>
+          <a:p>
+            <a:r>
+              <a:rPr lang="en-US" b="1" dirty="0" smtClean="0">
+                <a:latin typeface="Calibri" panose="020F0502020204030204" pitchFamily="34" charset="0"/>
+              </a:rPr>
+              <a:t>What Other People Think</a:t>
+            </a:r>
+            <a:endParaRPr lang="en-US" b="1" dirty="0">
+              <a:latin typeface="Calibri" panose="020F0502020204030204" pitchFamily="34" charset="0"/>
+            </a:endParaRPr>
+          </a:p>
+        </p:txBody>
+      </p:sp>
+      <p:sp>
+        <p:nvSpPr>
+          <p:cNvPr id="27" name="TextBox 26"/>
+          <p:cNvSpPr txBox="1"/>
+          <p:nvPr/>
+        </p:nvSpPr>
+        <p:spPr>
+          <a:xfrm>
+            <a:off x="4153989" y="4122187"/>
+            <a:ext cx="3703830" cy="738664"/>
+          </a:xfrm>
+          <a:prstGeom prst="rect">
+            <a:avLst/>
+          </a:prstGeom>
+          <a:noFill/>
+        </p:spPr>
+        <p:txBody>
+          <a:bodyPr wrap="square" rtlCol="0">
+            <a:spAutoFit/>
+          </a:bodyPr>
+          <a:lstStyle/>
+          <a:p>
+            <a:r>
+              <a:rPr lang="en-US" sz="1400" i="1" u="sng" dirty="0" smtClean="0">
+                <a:latin typeface="Calibri" panose="020F0502020204030204" pitchFamily="34" charset="0"/>
+              </a:rPr>
+              <a:t>Andrew Lee</a:t>
+            </a:r>
+            <a:r>
+              <a:rPr lang="en-US" sz="1400" dirty="0" smtClean="0">
+                <a:latin typeface="Calibri" panose="020F0502020204030204" pitchFamily="34" charset="0"/>
+              </a:rPr>
+              <a:t> – </a:t>
+            </a:r>
+            <a:r>
+              <a:rPr lang="en-US" sz="1400" dirty="0" smtClean="0">
+                <a:latin typeface="Calibri" panose="020F0502020204030204" pitchFamily="34" charset="0"/>
+              </a:rPr>
+              <a:t>BOTAK JONES! Damn good food at a damn good price! The </a:t>
+            </a:r>
+            <a:r>
+              <a:rPr lang="en-US" sz="1400" dirty="0" err="1" smtClean="0">
+                <a:latin typeface="Calibri" panose="020F0502020204030204" pitchFamily="34" charset="0"/>
+              </a:rPr>
+              <a:t>chilli</a:t>
+            </a:r>
+            <a:r>
+              <a:rPr lang="en-US" sz="1400" dirty="0" smtClean="0">
+                <a:latin typeface="Calibri" panose="020F0502020204030204" pitchFamily="34" charset="0"/>
+              </a:rPr>
+              <a:t> cheese fries are very nice. Must Try!</a:t>
+            </a:r>
+            <a:endParaRPr lang="en-US" sz="1400" dirty="0">
+              <a:latin typeface="Calibri" panose="020F0502020204030204" pitchFamily="34" charset="0"/>
+            </a:endParaRPr>
+          </a:p>
+        </p:txBody>
+      </p:sp>
+      <p:sp>
+        <p:nvSpPr>
+          <p:cNvPr id="28" name="TextBox 27"/>
+          <p:cNvSpPr txBox="1"/>
+          <p:nvPr/>
+        </p:nvSpPr>
+        <p:spPr>
+          <a:xfrm>
+            <a:off x="4153988" y="4839358"/>
+            <a:ext cx="3703830" cy="738664"/>
+          </a:xfrm>
+          <a:prstGeom prst="rect">
+            <a:avLst/>
+          </a:prstGeom>
+          <a:noFill/>
+        </p:spPr>
+        <p:txBody>
+          <a:bodyPr wrap="square" rtlCol="0">
+            <a:spAutoFit/>
+          </a:bodyPr>
+          <a:lstStyle/>
+          <a:p>
+            <a:r>
+              <a:rPr lang="en-US" sz="1400" i="1" u="sng" dirty="0" smtClean="0">
+                <a:latin typeface="Calibri" panose="020F0502020204030204" pitchFamily="34" charset="0"/>
+              </a:rPr>
+              <a:t>Melissa Ong</a:t>
+            </a:r>
+            <a:r>
+              <a:rPr lang="en-US" sz="1400" i="1" dirty="0" smtClean="0">
+                <a:latin typeface="Calibri" panose="020F0502020204030204" pitchFamily="34" charset="0"/>
+              </a:rPr>
+              <a:t> </a:t>
+            </a:r>
+            <a:r>
+              <a:rPr lang="en-US" sz="1400" dirty="0" smtClean="0">
+                <a:latin typeface="Calibri" panose="020F0502020204030204" pitchFamily="34" charset="0"/>
+              </a:rPr>
+              <a:t>– I think a bit over-rated. The Fish and Chips are a bit dry. But the portion is good and the price is right.</a:t>
+            </a:r>
+            <a:endParaRPr lang="en-US" sz="1400" dirty="0">
+              <a:latin typeface="Calibri" panose="020F0502020204030204" pitchFamily="34" charset="0"/>
+            </a:endParaRPr>
+          </a:p>
+        </p:txBody>
+      </p:sp>
+      <p:sp>
+        <p:nvSpPr>
+          <p:cNvPr id="13" name="TextBox 12"/>
+          <p:cNvSpPr txBox="1"/>
+          <p:nvPr/>
+        </p:nvSpPr>
+        <p:spPr>
+          <a:xfrm>
+            <a:off x="6907802" y="1799217"/>
+            <a:ext cx="782587" cy="523220"/>
+          </a:xfrm>
+          <a:prstGeom prst="rect">
+            <a:avLst/>
+          </a:prstGeom>
+          <a:noFill/>
+        </p:spPr>
+        <p:txBody>
+          <a:bodyPr wrap="none" rtlCol="0">
+            <a:spAutoFit/>
+          </a:bodyPr>
+          <a:lstStyle/>
+          <a:p>
+            <a:r>
+              <a:rPr lang="en-US" sz="2800" dirty="0" smtClean="0">
+                <a:solidFill>
+                  <a:schemeClr val="accent1">
+                    <a:lumMod val="60000"/>
+                    <a:lumOff val="40000"/>
+                  </a:schemeClr>
+                </a:solidFill>
+                <a:latin typeface="Arial Black" panose="020B0A04020102020204" pitchFamily="34" charset="0"/>
+              </a:rPr>
+              <a:t>7.7</a:t>
+            </a:r>
+            <a:endParaRPr lang="en-US" sz="2800" dirty="0">
+              <a:solidFill>
+                <a:schemeClr val="accent1">
+                  <a:lumMod val="60000"/>
+                  <a:lumOff val="40000"/>
+                </a:schemeClr>
+              </a:solidFill>
+              <a:latin typeface="Arial Black" panose="020B0A04020102020204" pitchFamily="34" charset="0"/>
+            </a:endParaRPr>
+          </a:p>
+        </p:txBody>
+      </p:sp>
+      <p:sp>
+        <p:nvSpPr>
+          <p:cNvPr id="14" name="TextBox 13"/>
+          <p:cNvSpPr txBox="1"/>
+          <p:nvPr/>
+        </p:nvSpPr>
+        <p:spPr>
+          <a:xfrm>
+            <a:off x="6825917" y="2153756"/>
+            <a:ext cx="973343" cy="253916"/>
+          </a:xfrm>
+          <a:prstGeom prst="rect">
+            <a:avLst/>
+          </a:prstGeom>
+          <a:noFill/>
+        </p:spPr>
+        <p:txBody>
+          <a:bodyPr wrap="none" rtlCol="0">
+            <a:spAutoFit/>
+          </a:bodyPr>
+          <a:lstStyle/>
+          <a:p>
+            <a:pPr algn="ctr"/>
+            <a:r>
+              <a:rPr lang="en-US" sz="1050" u="sng" dirty="0" smtClean="0">
+                <a:solidFill>
+                  <a:srgbClr val="00B0F0"/>
+                </a:solidFill>
+              </a:rPr>
+              <a:t>Rate this shop</a:t>
+            </a:r>
+            <a:endParaRPr lang="en-US" sz="1050" u="sng" dirty="0">
+              <a:solidFill>
+                <a:srgbClr val="00B0F0"/>
+              </a:solidFill>
+            </a:endParaRPr>
+          </a:p>
+        </p:txBody>
+      </p:sp>
+    </p:spTree>
+    <p:extLst>
+      <p:ext uri="{BB962C8B-B14F-4D97-AF65-F5344CB8AC3E}">
+        <p14:creationId xmlns:p14="http://schemas.microsoft.com/office/powerpoint/2010/main" val="3575019982"/>
+      </p:ext>
+    </p:extLst>
+  </p:cSld>
+  <p:clrMapOvr>
+    <a:masterClrMapping/>
+  </p:clrMapOvr>
+  <p:transition spd="slow">
+    <p:wipe/>
+  </p:transition>
+  <p:timing>
+    <p:tnLst>
+      <p:par>
+        <p:cTn id="1" dur="indefinite" restart="never" nodeType="tmRoot"/>
+      </p:par>
+    </p:tnLst>
+  </p:timing>
+</p:sld>
+</file>
+
+<file path=ppt/slides/slide18.xml><?xml version="1.0" encoding="utf-8"?>
+<p:sld xmlns:a="http://schemas.openxmlformats.org/drawingml/2006/main" xmlns:r="http://schemas.openxmlformats.org/officeDocument/2006/relationships" xmlns:p="http://schemas.openxmlformats.org/presentationml/2006/main">
+  <p:cSld>
+    <p:spTree>
+      <p:nvGrpSpPr>
+        <p:cNvPr id="1" name=""/>
+        <p:cNvGrpSpPr/>
+        <p:nvPr/>
+      </p:nvGrpSpPr>
+      <p:grpSpPr>
+        <a:xfrm>
+          <a:off x="0" y="0"/>
+          <a:ext cx="0" cy="0"/>
+          <a:chOff x="0" y="0"/>
+          <a:chExt cx="0" cy="0"/>
+        </a:xfrm>
+      </p:grpSpPr>
+      <p:sp>
+        <p:nvSpPr>
+          <p:cNvPr id="2" name="Title 1"/>
+          <p:cNvSpPr>
+            <a:spLocks noGrp="1"/>
+          </p:cNvSpPr>
+          <p:nvPr>
+            <p:ph type="ctrTitle"/>
+          </p:nvPr>
+        </p:nvSpPr>
+        <p:spPr/>
+        <p:txBody>
+          <a:bodyPr/>
+          <a:lstStyle/>
+          <a:p>
+            <a:r>
+              <a:rPr lang="en-US" dirty="0" smtClean="0"/>
+              <a:t>Hungry Go </a:t>
+            </a:r>
+            <a:r>
+              <a:rPr lang="en-US" u="sng" dirty="0" smtClean="0"/>
+              <a:t>T</a:t>
+            </a:r>
+            <a:r>
+              <a:rPr lang="en-US" dirty="0" smtClean="0"/>
+              <a:t>HERE</a:t>
+            </a:r>
+            <a:endParaRPr lang="en-US" dirty="0"/>
+          </a:p>
+        </p:txBody>
+      </p:sp>
+      <p:sp>
+        <p:nvSpPr>
+          <p:cNvPr id="3" name="Subtitle 2"/>
+          <p:cNvSpPr>
+            <a:spLocks noGrp="1"/>
+          </p:cNvSpPr>
+          <p:nvPr>
+            <p:ph type="subTitle" idx="1"/>
+          </p:nvPr>
+        </p:nvSpPr>
+        <p:spPr/>
+        <p:txBody>
+          <a:bodyPr/>
+          <a:lstStyle/>
+          <a:p>
+            <a:r>
+              <a:rPr lang="en-US" dirty="0" smtClean="0"/>
+              <a:t>When you don’t know what to eat, where to eat, and how to get there.</a:t>
+            </a:r>
+            <a:endParaRPr lang="en-US" dirty="0"/>
+          </a:p>
+        </p:txBody>
+      </p:sp>
+    </p:spTree>
+    <p:extLst>
+      <p:ext uri="{BB962C8B-B14F-4D97-AF65-F5344CB8AC3E}">
+        <p14:creationId xmlns:p14="http://schemas.microsoft.com/office/powerpoint/2010/main" val="4085042403"/>
+      </p:ext>
+    </p:extLst>
+  </p:cSld>
+  <p:clrMapOvr>
+    <a:masterClrMapping/>
+  </p:clrMapOvr>
   <p:timing>
     <p:tnLst>
       <p:par>
@@ -13623,11 +14534,7 @@
             <a:pPr algn="ctr"/>
             <a:r>
               <a:rPr lang="en-US" dirty="0" smtClean="0"/>
-              <a:t>ONE HOUR? Our lunch break is one hour only!</a:t>
-            </a:r>
-            <a:r>
-              <a:rPr lang="en-US" dirty="0" smtClean="0"/>
-              <a:t> </a:t>
+              <a:t>ONE HOUR? Our lunch break is one hour only! </a:t>
             </a:r>
             <a:endParaRPr lang="en-US" dirty="0"/>
           </a:p>
@@ -14451,7 +15358,7 @@
       </p:sp>
       <p:sp>
         <p:nvSpPr>
-          <p:cNvPr id="10" name="Rounded Rectangle 9">
+          <p:cNvPr id="17" name="Rounded Rectangle 16">
             <a:hlinkClick r:id="rId2" action="ppaction://hlinksldjump"/>
           </p:cNvPr>
           <p:cNvSpPr/>
@@ -14459,26 +15366,15 @@
         </p:nvSpPr>
         <p:spPr>
           <a:xfrm>
-            <a:off x="4482350" y="2277036"/>
-            <a:ext cx="3065929" cy="860612"/>
+            <a:off x="4153988" y="916836"/>
+            <a:ext cx="548640" cy="204374"/>
           </a:xfrm>
           <a:prstGeom prst="roundRect">
             <a:avLst/>
           </a:prstGeom>
           <a:solidFill>
-            <a:schemeClr val="bg1">
-              <a:lumMod val="50000"/>
-              <a:lumOff val="50000"/>
-            </a:schemeClr>
+            <a:schemeClr val="accent2"/>
           </a:solidFill>
-          <a:ln>
-            <a:solidFill>
-              <a:schemeClr val="bg1">
-                <a:lumMod val="50000"/>
-                <a:lumOff val="50000"/>
-              </a:schemeClr>
-            </a:solidFill>
-          </a:ln>
         </p:spPr>
         <p:style>
           <a:lnRef idx="2">
@@ -14502,47 +15398,56 @@
           <a:p>
             <a:pPr algn="ctr"/>
             <a:r>
-              <a:rPr lang="en-US" sz="2800" dirty="0" smtClean="0">
-                <a:latin typeface="Impact" panose="020B0806030902050204" pitchFamily="34" charset="0"/>
-              </a:rPr>
-              <a:t>Where Can Eat?</a:t>
-            </a:r>
-            <a:endParaRPr lang="en-US" sz="2800" dirty="0">
-              <a:latin typeface="Impact" panose="020B0806030902050204" pitchFamily="34" charset="0"/>
-            </a:endParaRPr>
-          </a:p>
-        </p:txBody>
-      </p:sp>
-      <p:sp>
-        <p:nvSpPr>
-          <p:cNvPr id="11" name="Rounded Rectangle 10">
-            <a:hlinkClick r:id="rId3" action="ppaction://hlinksldjump"/>
+              <a:rPr lang="en-US" sz="1200" dirty="0" smtClean="0"/>
+              <a:t>Back</a:t>
+            </a:r>
+            <a:endParaRPr lang="en-US" sz="1200" dirty="0"/>
+          </a:p>
+        </p:txBody>
+      </p:sp>
+      <p:pic>
+        <p:nvPicPr>
+          <p:cNvPr id="2" name="Picture 1"/>
+          <p:cNvPicPr>
+            <a:picLocks noChangeAspect="1"/>
+          </p:cNvPicPr>
+          <p:nvPr/>
+        </p:nvPicPr>
+        <p:blipFill>
+          <a:blip r:embed="rId3"/>
+          <a:stretch>
+            <a:fillRect/>
+          </a:stretch>
+        </p:blipFill>
+        <p:spPr>
+          <a:xfrm>
+            <a:off x="4119261" y="1354057"/>
+            <a:ext cx="3792108" cy="3112203"/>
+          </a:xfrm>
+          <a:prstGeom prst="rect">
+            <a:avLst/>
+          </a:prstGeom>
+        </p:spPr>
+      </p:pic>
+      <p:sp>
+        <p:nvSpPr>
+          <p:cNvPr id="19" name="Rounded Rectangle 18">
+            <a:hlinkClick r:id="rId4" action="ppaction://hlinksldjump"/>
           </p:cNvPr>
           <p:cNvSpPr/>
           <p:nvPr/>
         </p:nvSpPr>
         <p:spPr>
           <a:xfrm>
-            <a:off x="4482350" y="3478303"/>
-            <a:ext cx="3065929" cy="860612"/>
+            <a:off x="5264393" y="4808994"/>
+            <a:ext cx="1501844" cy="547825"/>
           </a:xfrm>
           <a:prstGeom prst="roundRect">
             <a:avLst/>
           </a:prstGeom>
           <a:solidFill>
-            <a:schemeClr val="bg1">
-              <a:lumMod val="50000"/>
-              <a:lumOff val="50000"/>
-            </a:schemeClr>
+            <a:schemeClr val="accent2"/>
           </a:solidFill>
-          <a:ln>
-            <a:solidFill>
-              <a:schemeClr val="bg1">
-                <a:lumMod val="50000"/>
-                <a:lumOff val="50000"/>
-              </a:schemeClr>
-            </a:solidFill>
-          </a:ln>
         </p:spPr>
         <p:style>
           <a:lnRef idx="2">
@@ -14566,12 +15471,12 @@
           <a:p>
             <a:pPr algn="ctr"/>
             <a:r>
-              <a:rPr lang="en-US" sz="2800" dirty="0" smtClean="0">
+              <a:rPr lang="en-US" dirty="0" smtClean="0">
                 <a:latin typeface="Impact" panose="020B0806030902050204" pitchFamily="34" charset="0"/>
               </a:rPr>
-              <a:t>Halfway Eat Where</a:t>
-            </a:r>
-            <a:endParaRPr lang="en-US" sz="2800" dirty="0">
+              <a:t>LIST VIEW</a:t>
+            </a:r>
+            <a:endParaRPr lang="en-US" dirty="0">
               <a:latin typeface="Impact" panose="020B0806030902050204" pitchFamily="34" charset="0"/>
             </a:endParaRPr>
           </a:p>
@@ -14579,77 +15484,63 @@
       </p:sp>
       <p:sp>
         <p:nvSpPr>
-          <p:cNvPr id="2" name="TextBox 1"/>
-          <p:cNvSpPr txBox="1"/>
-          <p:nvPr/>
-        </p:nvSpPr>
-        <p:spPr>
-          <a:xfrm>
-            <a:off x="4196064" y="1210565"/>
-            <a:ext cx="3638497" cy="707886"/>
+          <p:cNvPr id="3" name="Rectangle 2">
+            <a:hlinkClick r:id="rId5" action="ppaction://hlinksldjump"/>
+          </p:cNvPr>
+          <p:cNvSpPr/>
+          <p:nvPr/>
+        </p:nvSpPr>
+        <p:spPr>
+          <a:xfrm>
+            <a:off x="4305303" y="2928936"/>
+            <a:ext cx="119062" cy="266700"/>
           </a:xfrm>
           <a:prstGeom prst="rect">
             <a:avLst/>
           </a:prstGeom>
           <a:noFill/>
-        </p:spPr>
-        <p:txBody>
-          <a:bodyPr wrap="none" rtlCol="0">
-            <a:spAutoFit/>
-          </a:bodyPr>
+          <a:ln>
+            <a:noFill/>
+          </a:ln>
+        </p:spPr>
+        <p:style>
+          <a:lnRef idx="2">
+            <a:schemeClr val="accent1">
+              <a:shade val="50000"/>
+            </a:schemeClr>
+          </a:lnRef>
+          <a:fillRef idx="1">
+            <a:schemeClr val="accent1"/>
+          </a:fillRef>
+          <a:effectRef idx="0">
+            <a:schemeClr val="accent1"/>
+          </a:effectRef>
+          <a:fontRef idx="minor">
+            <a:schemeClr val="lt1"/>
+          </a:fontRef>
+        </p:style>
+        <p:txBody>
+          <a:bodyPr rtlCol="0" anchor="ctr"/>
           <a:lstStyle/>
           <a:p>
             <a:pPr algn="ctr"/>
-            <a:r>
-              <a:rPr lang="en-US" sz="4000" dirty="0" smtClean="0">
-                <a:latin typeface="Bernard MT Condensed" panose="02050806060905020404" pitchFamily="18" charset="0"/>
-              </a:rPr>
-              <a:t>Hungry </a:t>
-            </a:r>
-            <a:r>
-              <a:rPr lang="en-US" sz="4000" dirty="0">
-                <a:latin typeface="Bernard MT Condensed" panose="02050806060905020404" pitchFamily="18" charset="0"/>
-              </a:rPr>
-              <a:t>Go There</a:t>
-            </a:r>
-            <a:r>
-              <a:rPr lang="en-US" sz="4000" dirty="0" smtClean="0">
-                <a:latin typeface="Bernard MT Condensed" panose="02050806060905020404" pitchFamily="18" charset="0"/>
-              </a:rPr>
-              <a:t>!</a:t>
-            </a:r>
-            <a:r>
-              <a:rPr lang="en-US" sz="4000" dirty="0" smtClean="0"/>
-              <a:t>	</a:t>
-            </a:r>
-            <a:endParaRPr lang="en-US" sz="4000" dirty="0">
-              <a:latin typeface="Bernard MT Condensed" panose="02050806060905020404" pitchFamily="18" charset="0"/>
-            </a:endParaRPr>
+            <a:endParaRPr lang="en-US"/>
           </a:p>
         </p:txBody>
       </p:sp>
     </p:spTree>
     <p:extLst>
       <p:ext uri="{BB962C8B-B14F-4D97-AF65-F5344CB8AC3E}">
-        <p14:creationId xmlns:p14="http://schemas.microsoft.com/office/powerpoint/2010/main" val="2413268622"/>
+        <p14:creationId xmlns:p14="http://schemas.microsoft.com/office/powerpoint/2010/main" val="1854788680"/>
       </p:ext>
     </p:extLst>
   </p:cSld>
   <p:clrMapOvr>
     <a:masterClrMapping/>
   </p:clrMapOvr>
-  <mc:AlternateContent xmlns:mc="http://schemas.openxmlformats.org/markup-compatibility/2006" xmlns:p14="http://schemas.microsoft.com/office/powerpoint/2010/main">
-    <mc:Choice Requires="p14">
-      <p:transition p14:dur="100">
-        <p:cut/>
-      </p:transition>
-    </mc:Choice>
-    <mc:Fallback xmlns="">
-      <p:transition>
-        <p:cut/>
-      </p:transition>
-    </mc:Fallback>
-  </mc:AlternateContent>
+  <p:transition spd="slow">
+    <p:wipe/>
+  </p:transition>
   <p:timing>
     <p:tnLst>
       <p:par>

</xml_diff>